<commit_message>
Update dokumentacije za nova polja u bazi podataka
</commit_message>
<xml_diff>
--- a/01-documentation/Analiza zahteva - Use case dijagram , Dijagram aktivnosti, ER dijagram.pptx
+++ b/01-documentation/Analiza zahteva - Use case dijagram , Dijagram aktivnosti, ER dijagram.pptx
@@ -250,7 +250,7 @@
           <a:p>
             <a:fld id="{7A945F15-FD4B-4FFD-B946-EAA1AFA881B5}" type="datetimeFigureOut">
               <a:rPr lang="en-US" smtClean="0"/>
-              <a:t>5/24/2022</a:t>
+              <a:t>6/6/2022</a:t>
             </a:fld>
             <a:endParaRPr lang="en-US"/>
           </a:p>
@@ -420,7 +420,7 @@
           <a:p>
             <a:fld id="{7A945F15-FD4B-4FFD-B946-EAA1AFA881B5}" type="datetimeFigureOut">
               <a:rPr lang="en-US" smtClean="0"/>
-              <a:t>5/24/2022</a:t>
+              <a:t>6/6/2022</a:t>
             </a:fld>
             <a:endParaRPr lang="en-US"/>
           </a:p>
@@ -600,7 +600,7 @@
           <a:p>
             <a:fld id="{7A945F15-FD4B-4FFD-B946-EAA1AFA881B5}" type="datetimeFigureOut">
               <a:rPr lang="en-US" smtClean="0"/>
-              <a:t>5/24/2022</a:t>
+              <a:t>6/6/2022</a:t>
             </a:fld>
             <a:endParaRPr lang="en-US"/>
           </a:p>
@@ -770,7 +770,7 @@
           <a:p>
             <a:fld id="{7A945F15-FD4B-4FFD-B946-EAA1AFA881B5}" type="datetimeFigureOut">
               <a:rPr lang="en-US" smtClean="0"/>
-              <a:t>5/24/2022</a:t>
+              <a:t>6/6/2022</a:t>
             </a:fld>
             <a:endParaRPr lang="en-US"/>
           </a:p>
@@ -1016,7 +1016,7 @@
           <a:p>
             <a:fld id="{7A945F15-FD4B-4FFD-B946-EAA1AFA881B5}" type="datetimeFigureOut">
               <a:rPr lang="en-US" smtClean="0"/>
-              <a:t>5/24/2022</a:t>
+              <a:t>6/6/2022</a:t>
             </a:fld>
             <a:endParaRPr lang="en-US"/>
           </a:p>
@@ -1248,7 +1248,7 @@
           <a:p>
             <a:fld id="{7A945F15-FD4B-4FFD-B946-EAA1AFA881B5}" type="datetimeFigureOut">
               <a:rPr lang="en-US" smtClean="0"/>
-              <a:t>5/24/2022</a:t>
+              <a:t>6/6/2022</a:t>
             </a:fld>
             <a:endParaRPr lang="en-US"/>
           </a:p>
@@ -1615,7 +1615,7 @@
           <a:p>
             <a:fld id="{7A945F15-FD4B-4FFD-B946-EAA1AFA881B5}" type="datetimeFigureOut">
               <a:rPr lang="en-US" smtClean="0"/>
-              <a:t>5/24/2022</a:t>
+              <a:t>6/6/2022</a:t>
             </a:fld>
             <a:endParaRPr lang="en-US"/>
           </a:p>
@@ -1733,7 +1733,7 @@
           <a:p>
             <a:fld id="{7A945F15-FD4B-4FFD-B946-EAA1AFA881B5}" type="datetimeFigureOut">
               <a:rPr lang="en-US" smtClean="0"/>
-              <a:t>5/24/2022</a:t>
+              <a:t>6/6/2022</a:t>
             </a:fld>
             <a:endParaRPr lang="en-US"/>
           </a:p>
@@ -1828,7 +1828,7 @@
           <a:p>
             <a:fld id="{7A945F15-FD4B-4FFD-B946-EAA1AFA881B5}" type="datetimeFigureOut">
               <a:rPr lang="en-US" smtClean="0"/>
-              <a:t>5/24/2022</a:t>
+              <a:t>6/6/2022</a:t>
             </a:fld>
             <a:endParaRPr lang="en-US"/>
           </a:p>
@@ -2105,7 +2105,7 @@
           <a:p>
             <a:fld id="{7A945F15-FD4B-4FFD-B946-EAA1AFA881B5}" type="datetimeFigureOut">
               <a:rPr lang="en-US" smtClean="0"/>
-              <a:t>5/24/2022</a:t>
+              <a:t>6/6/2022</a:t>
             </a:fld>
             <a:endParaRPr lang="en-US"/>
           </a:p>
@@ -2358,7 +2358,7 @@
           <a:p>
             <a:fld id="{7A945F15-FD4B-4FFD-B946-EAA1AFA881B5}" type="datetimeFigureOut">
               <a:rPr lang="en-US" smtClean="0"/>
-              <a:t>5/24/2022</a:t>
+              <a:t>6/6/2022</a:t>
             </a:fld>
             <a:endParaRPr lang="en-US"/>
           </a:p>
@@ -2571,7 +2571,7 @@
           <a:p>
             <a:fld id="{7A945F15-FD4B-4FFD-B946-EAA1AFA881B5}" type="datetimeFigureOut">
               <a:rPr lang="en-US" smtClean="0"/>
-              <a:t>5/24/2022</a:t>
+              <a:t>6/6/2022</a:t>
             </a:fld>
             <a:endParaRPr lang="en-US"/>
           </a:p>
@@ -6488,8 +6488,8 @@
         </p:nvSpPr>
         <p:spPr>
           <a:xfrm>
-            <a:off x="8487322" y="3753452"/>
-            <a:ext cx="1084143" cy="369332"/>
+            <a:off x="8487322" y="3686949"/>
+            <a:ext cx="1366080" cy="523220"/>
           </a:xfrm>
           <a:prstGeom prst="rect">
             <a:avLst/>
@@ -6503,26 +6503,28 @@
           <a:lstStyle/>
           <a:p>
             <a:r>
-              <a:rPr lang="sr-Latn-RS" dirty="0">
-                <a:solidFill>
-                  <a:srgbClr val="00B050"/>
-                </a:solidFill>
-              </a:rPr>
-              <a:t>k</a:t>
-            </a:r>
-            <a:r>
-              <a:rPr lang="sr-Latn-RS" dirty="0" smtClean="0">
-                <a:solidFill>
-                  <a:srgbClr val="00B050"/>
-                </a:solidFill>
-              </a:rPr>
-              <a:t>arton_id</a:t>
-            </a:r>
-            <a:endParaRPr lang="en-US" dirty="0">
-              <a:solidFill>
-                <a:srgbClr val="00B050"/>
-              </a:solidFill>
-            </a:endParaRPr>
+              <a:rPr lang="sr-Latn-RS" dirty="0"/>
+              <a:t>s</a:t>
+            </a:r>
+            <a:r>
+              <a:rPr lang="sr-Latn-RS" dirty="0" smtClean="0"/>
+              <a:t>enioritet </a:t>
+            </a:r>
+          </a:p>
+          <a:p>
+            <a:r>
+              <a:rPr lang="sr-Latn-RS" sz="1000" dirty="0" smtClean="0"/>
+              <a:t>(</a:t>
+            </a:r>
+            <a:r>
+              <a:rPr lang="en-US" sz="1000" dirty="0" err="1"/>
+              <a:t>dete,penzioner,ostali</a:t>
+            </a:r>
+            <a:r>
+              <a:rPr lang="sr-Latn-RS" sz="1000" dirty="0"/>
+              <a:t>)</a:t>
+            </a:r>
+            <a:endParaRPr lang="en-US" sz="1000" dirty="0"/>
           </a:p>
         </p:txBody>
       </p:sp>
@@ -6632,9 +6634,9 @@
           <p:nvPr/>
         </p:nvCxnSpPr>
         <p:spPr>
-          <a:xfrm flipV="1">
-            <a:off x="8168409" y="2413584"/>
-            <a:ext cx="1924" cy="1795747"/>
+          <a:xfrm flipH="1" flipV="1">
+            <a:off x="8170333" y="2413585"/>
+            <a:ext cx="2276" cy="2029080"/>
           </a:xfrm>
           <a:prstGeom prst="line">
             <a:avLst/>
@@ -7519,44 +7521,6 @@
           </a:p>
         </p:txBody>
       </p:sp>
-      <p:sp>
-        <p:nvSpPr>
-          <p:cNvPr id="110" name="TextBox 109"/>
-          <p:cNvSpPr txBox="1"/>
-          <p:nvPr/>
-        </p:nvSpPr>
-        <p:spPr>
-          <a:xfrm>
-            <a:off x="4610027" y="5759750"/>
-            <a:ext cx="1084143" cy="369332"/>
-          </a:xfrm>
-          <a:prstGeom prst="rect">
-            <a:avLst/>
-          </a:prstGeom>
-          <a:noFill/>
-        </p:spPr>
-        <p:txBody>
-          <a:bodyPr wrap="none" rtlCol="0">
-            <a:spAutoFit/>
-          </a:bodyPr>
-          <a:lstStyle/>
-          <a:p>
-            <a:r>
-              <a:rPr lang="sr-Latn-RS" dirty="0" smtClean="0">
-                <a:solidFill>
-                  <a:srgbClr val="00B050"/>
-                </a:solidFill>
-              </a:rPr>
-              <a:t>karton_id</a:t>
-            </a:r>
-            <a:endParaRPr lang="en-US" dirty="0">
-              <a:solidFill>
-                <a:srgbClr val="00B050"/>
-              </a:solidFill>
-            </a:endParaRPr>
-          </a:p>
-        </p:txBody>
-      </p:sp>
       <p:cxnSp>
         <p:nvCxnSpPr>
           <p:cNvPr id="112" name="Straight Arrow Connector 111"/>
@@ -7565,7 +7529,7 @@
         </p:nvCxnSpPr>
         <p:spPr>
           <a:xfrm>
-            <a:off x="4272743" y="4585193"/>
+            <a:off x="4264430" y="4585193"/>
             <a:ext cx="374073" cy="1355"/>
           </a:xfrm>
           <a:prstGeom prst="straightConnector1">
@@ -7598,7 +7562,7 @@
         </p:nvCxnSpPr>
         <p:spPr>
           <a:xfrm>
-            <a:off x="4275515" y="4920474"/>
+            <a:off x="4267202" y="4920474"/>
             <a:ext cx="374073" cy="1355"/>
           </a:xfrm>
           <a:prstGeom prst="straightConnector1">
@@ -7631,7 +7595,7 @@
         </p:nvCxnSpPr>
         <p:spPr>
           <a:xfrm>
-            <a:off x="4283826" y="5277920"/>
+            <a:off x="4267200" y="5277920"/>
             <a:ext cx="374073" cy="1355"/>
           </a:xfrm>
           <a:prstGeom prst="straightConnector1">
@@ -7664,7 +7628,7 @@
         </p:nvCxnSpPr>
         <p:spPr>
           <a:xfrm>
-            <a:off x="4283825" y="5602115"/>
+            <a:off x="4267199" y="5602115"/>
             <a:ext cx="374073" cy="1355"/>
           </a:xfrm>
           <a:prstGeom prst="straightConnector1">
@@ -7697,7 +7661,7 @@
         </p:nvCxnSpPr>
         <p:spPr>
           <a:xfrm>
-            <a:off x="4275512" y="5934627"/>
+            <a:off x="4267199" y="5926314"/>
             <a:ext cx="374073" cy="1355"/>
           </a:xfrm>
           <a:prstGeom prst="straightConnector1">
@@ -7729,9 +7693,9 @@
           <p:nvPr/>
         </p:nvCxnSpPr>
         <p:spPr>
-          <a:xfrm flipH="1" flipV="1">
-            <a:off x="4267523" y="3869072"/>
-            <a:ext cx="11694" cy="2375896"/>
+          <a:xfrm flipV="1">
+            <a:off x="4267202" y="3869073"/>
+            <a:ext cx="322" cy="2065554"/>
           </a:xfrm>
           <a:prstGeom prst="line">
             <a:avLst/>
@@ -8383,7 +8347,7 @@
         </p:nvSpPr>
         <p:spPr>
           <a:xfrm>
-            <a:off x="8499597" y="4004546"/>
+            <a:off x="8499597" y="4245613"/>
             <a:ext cx="1194814" cy="369332"/>
           </a:xfrm>
           <a:prstGeom prst="rect">
@@ -8429,7 +8393,7 @@
         </p:nvCxnSpPr>
         <p:spPr>
           <a:xfrm>
-            <a:off x="8164790" y="3920003"/>
+            <a:off x="8173103" y="3870125"/>
             <a:ext cx="330198" cy="4322"/>
           </a:xfrm>
           <a:prstGeom prst="straightConnector1">
@@ -8462,7 +8426,7 @@
         </p:nvSpPr>
         <p:spPr>
           <a:xfrm>
-            <a:off x="4610026" y="6038982"/>
+            <a:off x="4610026" y="5731413"/>
             <a:ext cx="1002262" cy="369332"/>
           </a:xfrm>
           <a:prstGeom prst="rect">
@@ -8500,39 +8464,6 @@
           </a:p>
         </p:txBody>
       </p:sp>
-      <p:cxnSp>
-        <p:nvCxnSpPr>
-          <p:cNvPr id="152" name="Straight Arrow Connector 151"/>
-          <p:cNvCxnSpPr/>
-          <p:nvPr/>
-        </p:nvCxnSpPr>
-        <p:spPr>
-          <a:xfrm>
-            <a:off x="4269971" y="6244968"/>
-            <a:ext cx="374073" cy="1355"/>
-          </a:xfrm>
-          <a:prstGeom prst="straightConnector1">
-            <a:avLst/>
-          </a:prstGeom>
-          <a:ln>
-            <a:tailEnd type="triangle"/>
-          </a:ln>
-        </p:spPr>
-        <p:style>
-          <a:lnRef idx="1">
-            <a:schemeClr val="accent1"/>
-          </a:lnRef>
-          <a:fillRef idx="0">
-            <a:schemeClr val="accent1"/>
-          </a:fillRef>
-          <a:effectRef idx="0">
-            <a:schemeClr val="accent1"/>
-          </a:effectRef>
-          <a:fontRef idx="minor">
-            <a:schemeClr val="tx1"/>
-          </a:fontRef>
-        </p:style>
-      </p:cxnSp>
       <p:cxnSp>
         <p:nvCxnSpPr>
           <p:cNvPr id="104" name="Straight Arrow Connector 103"/>
@@ -9768,6 +9699,354 @@
             <a:r>
               <a:rPr lang="en-US" dirty="0" err="1" smtClean="0"/>
               <a:t>is_active</a:t>
+            </a:r>
+            <a:endParaRPr lang="en-US" dirty="0"/>
+          </a:p>
+        </p:txBody>
+      </p:sp>
+      <p:sp>
+        <p:nvSpPr>
+          <p:cNvPr id="163" name="TextBox 162"/>
+          <p:cNvSpPr txBox="1"/>
+          <p:nvPr/>
+        </p:nvSpPr>
+        <p:spPr>
+          <a:xfrm>
+            <a:off x="8969098" y="-65882"/>
+            <a:ext cx="537327" cy="369332"/>
+          </a:xfrm>
+          <a:prstGeom prst="rect">
+            <a:avLst/>
+          </a:prstGeom>
+          <a:noFill/>
+        </p:spPr>
+        <p:txBody>
+          <a:bodyPr wrap="none" rtlCol="0">
+            <a:spAutoFit/>
+          </a:bodyPr>
+          <a:lstStyle/>
+          <a:p>
+            <a:r>
+              <a:rPr lang="sr-Latn-RS" dirty="0" smtClean="0"/>
+              <a:t>ime</a:t>
+            </a:r>
+            <a:endParaRPr lang="en-US" dirty="0"/>
+          </a:p>
+        </p:txBody>
+      </p:sp>
+      <p:cxnSp>
+        <p:nvCxnSpPr>
+          <p:cNvPr id="164" name="Straight Arrow Connector 163"/>
+          <p:cNvCxnSpPr/>
+          <p:nvPr/>
+        </p:nvCxnSpPr>
+        <p:spPr>
+          <a:xfrm>
+            <a:off x="8393086" y="140146"/>
+            <a:ext cx="565265" cy="0"/>
+          </a:xfrm>
+          <a:prstGeom prst="straightConnector1">
+            <a:avLst/>
+          </a:prstGeom>
+          <a:ln>
+            <a:tailEnd type="triangle"/>
+          </a:ln>
+        </p:spPr>
+        <p:style>
+          <a:lnRef idx="1">
+            <a:schemeClr val="accent1"/>
+          </a:lnRef>
+          <a:fillRef idx="0">
+            <a:schemeClr val="accent1"/>
+          </a:fillRef>
+          <a:effectRef idx="0">
+            <a:schemeClr val="accent1"/>
+          </a:effectRef>
+          <a:fontRef idx="minor">
+            <a:schemeClr val="tx1"/>
+          </a:fontRef>
+        </p:style>
+      </p:cxnSp>
+      <p:cxnSp>
+        <p:nvCxnSpPr>
+          <p:cNvPr id="165" name="Straight Connector 164"/>
+          <p:cNvCxnSpPr/>
+          <p:nvPr/>
+        </p:nvCxnSpPr>
+        <p:spPr>
+          <a:xfrm flipV="1">
+            <a:off x="8390315" y="144088"/>
+            <a:ext cx="8464" cy="953321"/>
+          </a:xfrm>
+          <a:prstGeom prst="line">
+            <a:avLst/>
+          </a:prstGeom>
+        </p:spPr>
+        <p:style>
+          <a:lnRef idx="1">
+            <a:schemeClr val="accent1"/>
+          </a:lnRef>
+          <a:fillRef idx="0">
+            <a:schemeClr val="accent1"/>
+          </a:fillRef>
+          <a:effectRef idx="0">
+            <a:schemeClr val="accent1"/>
+          </a:effectRef>
+          <a:fontRef idx="minor">
+            <a:schemeClr val="tx1"/>
+          </a:fontRef>
+        </p:style>
+      </p:cxnSp>
+      <p:cxnSp>
+        <p:nvCxnSpPr>
+          <p:cNvPr id="166" name="Straight Arrow Connector 165"/>
+          <p:cNvCxnSpPr/>
+          <p:nvPr/>
+        </p:nvCxnSpPr>
+        <p:spPr>
+          <a:xfrm>
+            <a:off x="8398627" y="395071"/>
+            <a:ext cx="565265" cy="0"/>
+          </a:xfrm>
+          <a:prstGeom prst="straightConnector1">
+            <a:avLst/>
+          </a:prstGeom>
+          <a:ln>
+            <a:tailEnd type="triangle"/>
+          </a:ln>
+        </p:spPr>
+        <p:style>
+          <a:lnRef idx="1">
+            <a:schemeClr val="accent1"/>
+          </a:lnRef>
+          <a:fillRef idx="0">
+            <a:schemeClr val="accent1"/>
+          </a:fillRef>
+          <a:effectRef idx="0">
+            <a:schemeClr val="accent1"/>
+          </a:effectRef>
+          <a:fontRef idx="minor">
+            <a:schemeClr val="tx1"/>
+          </a:fontRef>
+        </p:style>
+      </p:cxnSp>
+      <p:cxnSp>
+        <p:nvCxnSpPr>
+          <p:cNvPr id="167" name="Straight Arrow Connector 166"/>
+          <p:cNvCxnSpPr/>
+          <p:nvPr/>
+        </p:nvCxnSpPr>
+        <p:spPr>
+          <a:xfrm>
+            <a:off x="8393079" y="638912"/>
+            <a:ext cx="565265" cy="0"/>
+          </a:xfrm>
+          <a:prstGeom prst="straightConnector1">
+            <a:avLst/>
+          </a:prstGeom>
+          <a:ln>
+            <a:tailEnd type="triangle"/>
+          </a:ln>
+        </p:spPr>
+        <p:style>
+          <a:lnRef idx="1">
+            <a:schemeClr val="accent1"/>
+          </a:lnRef>
+          <a:fillRef idx="0">
+            <a:schemeClr val="accent1"/>
+          </a:fillRef>
+          <a:effectRef idx="0">
+            <a:schemeClr val="accent1"/>
+          </a:effectRef>
+          <a:fontRef idx="minor">
+            <a:schemeClr val="tx1"/>
+          </a:fontRef>
+        </p:style>
+      </p:cxnSp>
+      <p:sp>
+        <p:nvSpPr>
+          <p:cNvPr id="168" name="TextBox 167"/>
+          <p:cNvSpPr txBox="1"/>
+          <p:nvPr/>
+        </p:nvSpPr>
+        <p:spPr>
+          <a:xfrm>
+            <a:off x="8971870" y="202895"/>
+            <a:ext cx="940835" cy="369332"/>
+          </a:xfrm>
+          <a:prstGeom prst="rect">
+            <a:avLst/>
+          </a:prstGeom>
+          <a:noFill/>
+        </p:spPr>
+        <p:txBody>
+          <a:bodyPr wrap="none" rtlCol="0">
+            <a:spAutoFit/>
+          </a:bodyPr>
+          <a:lstStyle/>
+          <a:p>
+            <a:r>
+              <a:rPr lang="sr-Latn-RS" dirty="0" smtClean="0"/>
+              <a:t>prezime</a:t>
+            </a:r>
+            <a:endParaRPr lang="en-US" dirty="0"/>
+          </a:p>
+        </p:txBody>
+      </p:sp>
+      <p:sp>
+        <p:nvSpPr>
+          <p:cNvPr id="169" name="TextBox 168"/>
+          <p:cNvSpPr txBox="1"/>
+          <p:nvPr/>
+        </p:nvSpPr>
+        <p:spPr>
+          <a:xfrm>
+            <a:off x="8966327" y="430107"/>
+            <a:ext cx="700833" cy="369332"/>
+          </a:xfrm>
+          <a:prstGeom prst="rect">
+            <a:avLst/>
+          </a:prstGeom>
+          <a:noFill/>
+        </p:spPr>
+        <p:txBody>
+          <a:bodyPr wrap="none" rtlCol="0">
+            <a:spAutoFit/>
+          </a:bodyPr>
+          <a:lstStyle/>
+          <a:p>
+            <a:r>
+              <a:rPr lang="sr-Latn-RS" dirty="0" smtClean="0"/>
+              <a:t>email</a:t>
+            </a:r>
+            <a:endParaRPr lang="en-US" dirty="0"/>
+          </a:p>
+        </p:txBody>
+      </p:sp>
+      <p:sp>
+        <p:nvSpPr>
+          <p:cNvPr id="170" name="TextBox 169"/>
+          <p:cNvSpPr txBox="1"/>
+          <p:nvPr/>
+        </p:nvSpPr>
+        <p:spPr>
+          <a:xfrm>
+            <a:off x="8969098" y="873451"/>
+            <a:ext cx="654346" cy="369332"/>
+          </a:xfrm>
+          <a:prstGeom prst="rect">
+            <a:avLst/>
+          </a:prstGeom>
+          <a:noFill/>
+        </p:spPr>
+        <p:txBody>
+          <a:bodyPr wrap="none" rtlCol="0">
+            <a:spAutoFit/>
+          </a:bodyPr>
+          <a:lstStyle/>
+          <a:p>
+            <a:r>
+              <a:rPr lang="sr-Latn-RS" dirty="0"/>
+              <a:t>j</a:t>
+            </a:r>
+            <a:r>
+              <a:rPr lang="sr-Latn-RS" dirty="0" smtClean="0"/>
+              <a:t>mbg</a:t>
+            </a:r>
+          </a:p>
+        </p:txBody>
+      </p:sp>
+      <p:cxnSp>
+        <p:nvCxnSpPr>
+          <p:cNvPr id="171" name="Straight Arrow Connector 170"/>
+          <p:cNvCxnSpPr/>
+          <p:nvPr/>
+        </p:nvCxnSpPr>
+        <p:spPr>
+          <a:xfrm>
+            <a:off x="8387544" y="1098882"/>
+            <a:ext cx="565265" cy="0"/>
+          </a:xfrm>
+          <a:prstGeom prst="straightConnector1">
+            <a:avLst/>
+          </a:prstGeom>
+          <a:ln>
+            <a:tailEnd type="triangle"/>
+          </a:ln>
+        </p:spPr>
+        <p:style>
+          <a:lnRef idx="1">
+            <a:schemeClr val="accent1"/>
+          </a:lnRef>
+          <a:fillRef idx="0">
+            <a:schemeClr val="accent1"/>
+          </a:fillRef>
+          <a:effectRef idx="0">
+            <a:schemeClr val="accent1"/>
+          </a:effectRef>
+          <a:fontRef idx="minor">
+            <a:schemeClr val="tx1"/>
+          </a:fontRef>
+        </p:style>
+      </p:cxnSp>
+      <p:cxnSp>
+        <p:nvCxnSpPr>
+          <p:cNvPr id="172" name="Straight Arrow Connector 171"/>
+          <p:cNvCxnSpPr/>
+          <p:nvPr/>
+        </p:nvCxnSpPr>
+        <p:spPr>
+          <a:xfrm>
+            <a:off x="8172609" y="4440537"/>
+            <a:ext cx="330198" cy="4322"/>
+          </a:xfrm>
+          <a:prstGeom prst="straightConnector1">
+            <a:avLst/>
+          </a:prstGeom>
+          <a:ln>
+            <a:tailEnd type="triangle"/>
+          </a:ln>
+        </p:spPr>
+        <p:style>
+          <a:lnRef idx="1">
+            <a:schemeClr val="accent1"/>
+          </a:lnRef>
+          <a:fillRef idx="0">
+            <a:schemeClr val="accent1"/>
+          </a:fillRef>
+          <a:effectRef idx="0">
+            <a:schemeClr val="accent1"/>
+          </a:effectRef>
+          <a:fontRef idx="minor">
+            <a:schemeClr val="tx1"/>
+          </a:fontRef>
+        </p:style>
+      </p:cxnSp>
+      <p:sp>
+        <p:nvSpPr>
+          <p:cNvPr id="173" name="TextBox 172"/>
+          <p:cNvSpPr txBox="1"/>
+          <p:nvPr/>
+        </p:nvSpPr>
+        <p:spPr>
+          <a:xfrm>
+            <a:off x="8490094" y="4047172"/>
+            <a:ext cx="700833" cy="369332"/>
+          </a:xfrm>
+          <a:prstGeom prst="rect">
+            <a:avLst/>
+          </a:prstGeom>
+          <a:noFill/>
+        </p:spPr>
+        <p:txBody>
+          <a:bodyPr wrap="none" rtlCol="0">
+            <a:spAutoFit/>
+          </a:bodyPr>
+          <a:lstStyle/>
+          <a:p>
+            <a:r>
+              <a:rPr lang="sr-Latn-RS" dirty="0" smtClean="0"/>
+              <a:t>email</a:t>
             </a:r>
             <a:endParaRPr lang="en-US" dirty="0"/>
           </a:p>

</xml_diff>

<commit_message>
Reorganizacija baze podataka i njene dokumentacije
</commit_message>
<xml_diff>
--- a/01-documentation/Analiza zahteva - Use case dijagram , Dijagram aktivnosti, ER dijagram.pptx
+++ b/01-documentation/Analiza zahteva - Use case dijagram , Dijagram aktivnosti, ER dijagram.pptx
@@ -250,7 +250,7 @@
           <a:p>
             <a:fld id="{7A945F15-FD4B-4FFD-B946-EAA1AFA881B5}" type="datetimeFigureOut">
               <a:rPr lang="en-US" smtClean="0"/>
-              <a:t>6/6/2022</a:t>
+              <a:t>6/10/2022</a:t>
             </a:fld>
             <a:endParaRPr lang="en-US"/>
           </a:p>
@@ -420,7 +420,7 @@
           <a:p>
             <a:fld id="{7A945F15-FD4B-4FFD-B946-EAA1AFA881B5}" type="datetimeFigureOut">
               <a:rPr lang="en-US" smtClean="0"/>
-              <a:t>6/6/2022</a:t>
+              <a:t>6/10/2022</a:t>
             </a:fld>
             <a:endParaRPr lang="en-US"/>
           </a:p>
@@ -600,7 +600,7 @@
           <a:p>
             <a:fld id="{7A945F15-FD4B-4FFD-B946-EAA1AFA881B5}" type="datetimeFigureOut">
               <a:rPr lang="en-US" smtClean="0"/>
-              <a:t>6/6/2022</a:t>
+              <a:t>6/10/2022</a:t>
             </a:fld>
             <a:endParaRPr lang="en-US"/>
           </a:p>
@@ -770,7 +770,7 @@
           <a:p>
             <a:fld id="{7A945F15-FD4B-4FFD-B946-EAA1AFA881B5}" type="datetimeFigureOut">
               <a:rPr lang="en-US" smtClean="0"/>
-              <a:t>6/6/2022</a:t>
+              <a:t>6/10/2022</a:t>
             </a:fld>
             <a:endParaRPr lang="en-US"/>
           </a:p>
@@ -1016,7 +1016,7 @@
           <a:p>
             <a:fld id="{7A945F15-FD4B-4FFD-B946-EAA1AFA881B5}" type="datetimeFigureOut">
               <a:rPr lang="en-US" smtClean="0"/>
-              <a:t>6/6/2022</a:t>
+              <a:t>6/10/2022</a:t>
             </a:fld>
             <a:endParaRPr lang="en-US"/>
           </a:p>
@@ -1248,7 +1248,7 @@
           <a:p>
             <a:fld id="{7A945F15-FD4B-4FFD-B946-EAA1AFA881B5}" type="datetimeFigureOut">
               <a:rPr lang="en-US" smtClean="0"/>
-              <a:t>6/6/2022</a:t>
+              <a:t>6/10/2022</a:t>
             </a:fld>
             <a:endParaRPr lang="en-US"/>
           </a:p>
@@ -1615,7 +1615,7 @@
           <a:p>
             <a:fld id="{7A945F15-FD4B-4FFD-B946-EAA1AFA881B5}" type="datetimeFigureOut">
               <a:rPr lang="en-US" smtClean="0"/>
-              <a:t>6/6/2022</a:t>
+              <a:t>6/10/2022</a:t>
             </a:fld>
             <a:endParaRPr lang="en-US"/>
           </a:p>
@@ -1733,7 +1733,7 @@
           <a:p>
             <a:fld id="{7A945F15-FD4B-4FFD-B946-EAA1AFA881B5}" type="datetimeFigureOut">
               <a:rPr lang="en-US" smtClean="0"/>
-              <a:t>6/6/2022</a:t>
+              <a:t>6/10/2022</a:t>
             </a:fld>
             <a:endParaRPr lang="en-US"/>
           </a:p>
@@ -1828,7 +1828,7 @@
           <a:p>
             <a:fld id="{7A945F15-FD4B-4FFD-B946-EAA1AFA881B5}" type="datetimeFigureOut">
               <a:rPr lang="en-US" smtClean="0"/>
-              <a:t>6/6/2022</a:t>
+              <a:t>6/10/2022</a:t>
             </a:fld>
             <a:endParaRPr lang="en-US"/>
           </a:p>
@@ -2105,7 +2105,7 @@
           <a:p>
             <a:fld id="{7A945F15-FD4B-4FFD-B946-EAA1AFA881B5}" type="datetimeFigureOut">
               <a:rPr lang="en-US" smtClean="0"/>
-              <a:t>6/6/2022</a:t>
+              <a:t>6/10/2022</a:t>
             </a:fld>
             <a:endParaRPr lang="en-US"/>
           </a:p>
@@ -2358,7 +2358,7 @@
           <a:p>
             <a:fld id="{7A945F15-FD4B-4FFD-B946-EAA1AFA881B5}" type="datetimeFigureOut">
               <a:rPr lang="en-US" smtClean="0"/>
-              <a:t>6/6/2022</a:t>
+              <a:t>6/10/2022</a:t>
             </a:fld>
             <a:endParaRPr lang="en-US"/>
           </a:p>
@@ -2571,7 +2571,7 @@
           <a:p>
             <a:fld id="{7A945F15-FD4B-4FFD-B946-EAA1AFA881B5}" type="datetimeFigureOut">
               <a:rPr lang="en-US" smtClean="0"/>
-              <a:t>6/6/2022</a:t>
+              <a:t>6/10/2022</a:t>
             </a:fld>
             <a:endParaRPr lang="en-US"/>
           </a:p>
@@ -5209,7 +5209,15 @@
           <a:p>
             <a:r>
               <a:rPr lang="sr-Latn-RS" dirty="0" smtClean="0"/>
-              <a:t>račun</a:t>
+              <a:t>ra</a:t>
+            </a:r>
+            <a:r>
+              <a:rPr lang="en-US" dirty="0" smtClean="0"/>
+              <a:t>c</a:t>
+            </a:r>
+            <a:r>
+              <a:rPr lang="sr-Latn-RS" dirty="0" smtClean="0"/>
+              <a:t>un</a:t>
             </a:r>
             <a:endParaRPr lang="en-US" dirty="0"/>
           </a:p>
@@ -5224,7 +5232,7 @@
         <p:spPr>
           <a:xfrm>
             <a:off x="376054" y="3676439"/>
-            <a:ext cx="1683538" cy="369332"/>
+            <a:ext cx="1429174" cy="369332"/>
           </a:xfrm>
           <a:prstGeom prst="rect">
             <a:avLst/>
@@ -5243,43 +5251,16 @@
           <a:lstStyle/>
           <a:p>
             <a:r>
+              <a:rPr lang="en-US" dirty="0" err="1" smtClean="0"/>
+              <a:t>racun</a:t>
+            </a:r>
+            <a:r>
               <a:rPr lang="sr-Latn-RS" dirty="0" smtClean="0"/>
-              <a:t>intervencija_log</a:t>
-            </a:r>
-            <a:endParaRPr lang="en-US" dirty="0"/>
-          </a:p>
-        </p:txBody>
-      </p:sp>
-      <p:sp>
-        <p:nvSpPr>
-          <p:cNvPr id="11" name="TextBox 10"/>
-          <p:cNvSpPr txBox="1"/>
-          <p:nvPr/>
-        </p:nvSpPr>
-        <p:spPr>
-          <a:xfrm>
-            <a:off x="376054" y="4158946"/>
-            <a:ext cx="794000" cy="369332"/>
-          </a:xfrm>
-          <a:prstGeom prst="rect">
-            <a:avLst/>
-          </a:prstGeom>
-          <a:noFill/>
-          <a:ln w="12700">
-            <a:solidFill>
-              <a:schemeClr val="tx1"/>
-            </a:solidFill>
-          </a:ln>
-        </p:spPr>
-        <p:txBody>
-          <a:bodyPr wrap="none" rtlCol="0">
-            <a:spAutoFit/>
-          </a:bodyPr>
-          <a:lstStyle/>
-          <a:p>
-            <a:r>
-              <a:rPr lang="sr-Latn-RS" dirty="0" smtClean="0"/>
-              <a:t>karton</a:t>
+              <a:t>_</a:t>
+            </a:r>
+            <a:r>
+              <a:rPr lang="en-US" dirty="0" err="1" smtClean="0"/>
+              <a:t>usluga</a:t>
             </a:r>
             <a:endParaRPr lang="en-US" dirty="0"/>
           </a:p>
@@ -5863,20 +5844,16 @@
           <a:lstStyle/>
           <a:p>
             <a:r>
-              <a:rPr lang="sr-Latn-RS" sz="1700" dirty="0"/>
-              <a:t>k</a:t>
-            </a:r>
-            <a:r>
-              <a:rPr lang="sr-Latn-RS" sz="1700" dirty="0" smtClean="0"/>
-              <a:t>ataloški_broj</a:t>
-            </a:r>
-            <a:r>
-              <a:rPr lang="sr-Latn-RS" sz="1600" dirty="0" smtClean="0"/>
-              <a:t> </a:t>
-            </a:r>
-            <a:r>
-              <a:rPr lang="sr-Latn-RS" sz="1100" dirty="0" smtClean="0"/>
-              <a:t>(šifra_usluge)</a:t>
+              <a:rPr lang="en-US" sz="1700" dirty="0" smtClean="0"/>
+              <a:t>  </a:t>
+            </a:r>
+            <a:r>
+              <a:rPr lang="en-US" sz="1700" dirty="0" err="1" smtClean="0"/>
+              <a:t>s</a:t>
+            </a:r>
+            <a:r>
+              <a:rPr lang="en-US" sz="1700" dirty="0" err="1" smtClean="0"/>
+              <a:t>ifra_usluge</a:t>
             </a:r>
             <a:endParaRPr lang="en-US" sz="1100" dirty="0"/>
           </a:p>
@@ -5938,8 +5915,8 @@
         </p:nvSpPr>
         <p:spPr>
           <a:xfrm>
-            <a:off x="10134377" y="4505290"/>
-            <a:ext cx="630301" cy="369332"/>
+            <a:off x="10117106" y="4557956"/>
+            <a:ext cx="1815433" cy="292388"/>
           </a:xfrm>
           <a:prstGeom prst="rect">
             <a:avLst/>
@@ -5953,10 +5930,22 @@
           <a:lstStyle/>
           <a:p>
             <a:r>
-              <a:rPr lang="sr-Latn-RS" dirty="0" smtClean="0"/>
-              <a:t>cena</a:t>
-            </a:r>
-            <a:endParaRPr lang="en-US" dirty="0"/>
+              <a:rPr lang="en-US" sz="1300" dirty="0" smtClean="0"/>
+              <a:t>c</a:t>
+            </a:r>
+            <a:r>
+              <a:rPr lang="sr-Latn-RS" sz="1300" dirty="0" smtClean="0"/>
+              <a:t>ena</a:t>
+            </a:r>
+            <a:r>
+              <a:rPr lang="en-US" sz="1300" dirty="0" smtClean="0"/>
+              <a:t>_</a:t>
+            </a:r>
+            <a:r>
+              <a:rPr lang="en-US" sz="1300" dirty="0" err="1" smtClean="0"/>
+              <a:t>pojedinacna_dete</a:t>
+            </a:r>
+            <a:endParaRPr lang="en-US" sz="1300" dirty="0"/>
           </a:p>
         </p:txBody>
       </p:sp>
@@ -5968,8 +5957,8 @@
         </p:nvSpPr>
         <p:spPr>
           <a:xfrm>
-            <a:off x="10134377" y="4766793"/>
-            <a:ext cx="1471878" cy="369332"/>
+            <a:off x="10082743" y="4809138"/>
+            <a:ext cx="2188420" cy="292388"/>
           </a:xfrm>
           <a:prstGeom prst="rect">
             <a:avLst/>
@@ -5983,14 +5972,22 @@
           <a:lstStyle/>
           <a:p>
             <a:r>
-              <a:rPr lang="en-US" dirty="0" err="1" smtClean="0"/>
-              <a:t>popust</a:t>
-            </a:r>
-            <a:r>
-              <a:rPr lang="sr-Latn-RS" dirty="0" smtClean="0"/>
-              <a:t>_paket</a:t>
-            </a:r>
-            <a:endParaRPr lang="en-US" dirty="0"/>
+              <a:rPr lang="en-US" sz="1300" dirty="0"/>
+              <a:t>c</a:t>
+            </a:r>
+            <a:r>
+              <a:rPr lang="sr-Latn-RS" sz="1300" dirty="0"/>
+              <a:t>ena</a:t>
+            </a:r>
+            <a:r>
+              <a:rPr lang="en-US" sz="1300" dirty="0" smtClean="0"/>
+              <a:t>_</a:t>
+            </a:r>
+            <a:r>
+              <a:rPr lang="en-US" sz="1300" dirty="0" err="1" smtClean="0"/>
+              <a:t>pojedinacna_penzioner</a:t>
+            </a:r>
+            <a:endParaRPr lang="en-US" sz="1300" dirty="0"/>
           </a:p>
         </p:txBody>
       </p:sp>
@@ -6002,8 +5999,8 @@
         </p:nvSpPr>
         <p:spPr>
           <a:xfrm>
-            <a:off x="10134377" y="4997732"/>
-            <a:ext cx="1894108" cy="369332"/>
+            <a:off x="10120718" y="5048060"/>
+            <a:ext cx="1870320" cy="292388"/>
           </a:xfrm>
           <a:prstGeom prst="rect">
             <a:avLst/>
@@ -6017,14 +6014,22 @@
           <a:lstStyle/>
           <a:p>
             <a:r>
-              <a:rPr lang="en-US" dirty="0" err="1" smtClean="0"/>
-              <a:t>popust</a:t>
-            </a:r>
-            <a:r>
-              <a:rPr lang="sr-Latn-RS" dirty="0" smtClean="0"/>
-              <a:t>_penzioner</a:t>
-            </a:r>
-            <a:endParaRPr lang="en-US" dirty="0"/>
+              <a:rPr lang="en-US" sz="1300" dirty="0"/>
+              <a:t>c</a:t>
+            </a:r>
+            <a:r>
+              <a:rPr lang="sr-Latn-RS" sz="1300" dirty="0"/>
+              <a:t>ena</a:t>
+            </a:r>
+            <a:r>
+              <a:rPr lang="en-US" sz="1300" dirty="0" smtClean="0"/>
+              <a:t>_</a:t>
+            </a:r>
+            <a:r>
+              <a:rPr lang="en-US" sz="1300" dirty="0" err="1" smtClean="0"/>
+              <a:t>pojedinacna_ostali</a:t>
+            </a:r>
+            <a:endParaRPr lang="en-US" sz="1300" dirty="0"/>
           </a:p>
         </p:txBody>
       </p:sp>
@@ -6036,8 +6041,8 @@
         </p:nvSpPr>
         <p:spPr>
           <a:xfrm>
-            <a:off x="10134377" y="5259235"/>
-            <a:ext cx="1377428" cy="369332"/>
+            <a:off x="10127518" y="5281787"/>
+            <a:ext cx="1358705" cy="292388"/>
           </a:xfrm>
           <a:prstGeom prst="rect">
             <a:avLst/>
@@ -6051,14 +6056,22 @@
           <a:lstStyle/>
           <a:p>
             <a:r>
-              <a:rPr lang="en-US" dirty="0" err="1" smtClean="0"/>
-              <a:t>popust</a:t>
-            </a:r>
-            <a:r>
-              <a:rPr lang="sr-Latn-RS" dirty="0" smtClean="0"/>
-              <a:t>_dete</a:t>
-            </a:r>
-            <a:endParaRPr lang="en-US" dirty="0"/>
+              <a:rPr lang="en-US" sz="1300" dirty="0"/>
+              <a:t>c</a:t>
+            </a:r>
+            <a:r>
+              <a:rPr lang="sr-Latn-RS" sz="1300" dirty="0" smtClean="0"/>
+              <a:t>ena</a:t>
+            </a:r>
+            <a:r>
+              <a:rPr lang="en-US" sz="1300" dirty="0" smtClean="0"/>
+              <a:t>_</a:t>
+            </a:r>
+            <a:r>
+              <a:rPr lang="en-US" sz="1300" dirty="0" err="1" smtClean="0"/>
+              <a:t>paket_dete</a:t>
+            </a:r>
+            <a:endParaRPr lang="en-US" sz="1300" dirty="0"/>
           </a:p>
         </p:txBody>
       </p:sp>
@@ -6303,8 +6316,8 @@
         </p:nvCxnSpPr>
         <p:spPr>
           <a:xfrm flipH="1" flipV="1">
-            <a:off x="9908408" y="3033750"/>
-            <a:ext cx="42536" cy="2684301"/>
+            <a:off x="9914313" y="3022844"/>
+            <a:ext cx="43992" cy="3128552"/>
           </a:xfrm>
           <a:prstGeom prst="line">
             <a:avLst/>
@@ -6779,8 +6792,8 @@
           <a:lstStyle/>
           <a:p>
             <a:r>
-              <a:rPr lang="sr-Latn-RS" dirty="0"/>
-              <a:t>š</a:t>
+              <a:rPr lang="en-US" dirty="0"/>
+              <a:t>s</a:t>
             </a:r>
             <a:r>
               <a:rPr lang="sr-Latn-RS" dirty="0" smtClean="0"/>
@@ -6902,7 +6915,7 @@
           </a:xfrm>
           <a:prstGeom prst="bentConnector3">
             <a:avLst>
-              <a:gd name="adj1" fmla="val 72424"/>
+              <a:gd name="adj1" fmla="val 71252"/>
             </a:avLst>
           </a:prstGeom>
           <a:ln>
@@ -7012,7 +7025,7 @@
         </p:nvSpPr>
         <p:spPr>
           <a:xfrm>
-            <a:off x="8020357" y="5111184"/>
+            <a:off x="8032140" y="5954405"/>
             <a:ext cx="1224502" cy="369332"/>
           </a:xfrm>
           <a:prstGeom prst="rect">
@@ -7058,7 +7071,7 @@
         </p:nvSpPr>
         <p:spPr>
           <a:xfrm>
-            <a:off x="8025750" y="5386806"/>
+            <a:off x="8027628" y="5039983"/>
             <a:ext cx="1708029" cy="584775"/>
           </a:xfrm>
           <a:prstGeom prst="rect">
@@ -7085,36 +7098,6 @@
               <a:t>(pojedinacna,paket)</a:t>
             </a:r>
             <a:endParaRPr lang="en-US" sz="1400" dirty="0"/>
-          </a:p>
-        </p:txBody>
-      </p:sp>
-      <p:sp>
-        <p:nvSpPr>
-          <p:cNvPr id="93" name="TextBox 92"/>
-          <p:cNvSpPr txBox="1"/>
-          <p:nvPr/>
-        </p:nvSpPr>
-        <p:spPr>
-          <a:xfrm>
-            <a:off x="8020357" y="5896057"/>
-            <a:ext cx="630301" cy="369332"/>
-          </a:xfrm>
-          <a:prstGeom prst="rect">
-            <a:avLst/>
-          </a:prstGeom>
-          <a:noFill/>
-        </p:spPr>
-        <p:txBody>
-          <a:bodyPr wrap="none" rtlCol="0">
-            <a:spAutoFit/>
-          </a:bodyPr>
-          <a:lstStyle/>
-          <a:p>
-            <a:r>
-              <a:rPr lang="sr-Latn-RS" dirty="0" smtClean="0"/>
-              <a:t>cena</a:t>
-            </a:r>
-            <a:endParaRPr lang="en-US" dirty="0"/>
           </a:p>
         </p:txBody>
       </p:sp>
@@ -7192,7 +7175,7 @@
         </p:nvCxnSpPr>
         <p:spPr>
           <a:xfrm>
-            <a:off x="7713433" y="5599017"/>
+            <a:off x="7713433" y="5717553"/>
             <a:ext cx="339399" cy="0"/>
           </a:xfrm>
           <a:prstGeom prst="straightConnector1">
@@ -7225,7 +7208,7 @@
         </p:nvCxnSpPr>
         <p:spPr>
           <a:xfrm>
-            <a:off x="7712219" y="6070466"/>
+            <a:off x="7712219" y="6155132"/>
             <a:ext cx="339399" cy="0"/>
           </a:xfrm>
           <a:prstGeom prst="straightConnector1">
@@ -7257,9 +7240,9 @@
           <p:nvPr/>
         </p:nvCxnSpPr>
         <p:spPr>
-          <a:xfrm flipV="1">
-            <a:off x="7710270" y="4665017"/>
-            <a:ext cx="6713" cy="1912352"/>
+          <a:xfrm flipH="1" flipV="1">
+            <a:off x="7716983" y="4665017"/>
+            <a:ext cx="5437" cy="1767364"/>
           </a:xfrm>
           <a:prstGeom prst="line">
             <a:avLst/>
@@ -7290,8 +7273,8 @@
         </p:nvCxnSpPr>
         <p:spPr>
           <a:xfrm flipV="1">
-            <a:off x="2059592" y="3856780"/>
-            <a:ext cx="2553972" cy="4325"/>
+            <a:off x="1805228" y="3856781"/>
+            <a:ext cx="2808336" cy="4324"/>
           </a:xfrm>
           <a:prstGeom prst="straightConnector1">
             <a:avLst/>
@@ -7409,81 +7392,13 @@
       </p:sp>
       <p:sp>
         <p:nvSpPr>
-          <p:cNvPr id="107" name="TextBox 106"/>
-          <p:cNvSpPr txBox="1"/>
-          <p:nvPr/>
-        </p:nvSpPr>
-        <p:spPr>
-          <a:xfrm>
-            <a:off x="4613564" y="4718916"/>
-            <a:ext cx="1143775" cy="369332"/>
-          </a:xfrm>
-          <a:prstGeom prst="rect">
-            <a:avLst/>
-          </a:prstGeom>
-          <a:noFill/>
-        </p:spPr>
-        <p:txBody>
-          <a:bodyPr wrap="none" rtlCol="0">
-            <a:spAutoFit/>
-          </a:bodyPr>
-          <a:lstStyle/>
-          <a:p>
-            <a:r>
-              <a:rPr lang="sr-Latn-RS" dirty="0"/>
-              <a:t>š</a:t>
-            </a:r>
-            <a:r>
-              <a:rPr lang="sr-Latn-RS" dirty="0" smtClean="0"/>
-              <a:t>ifra_zuba</a:t>
-            </a:r>
-            <a:endParaRPr lang="en-US" dirty="0"/>
-          </a:p>
-        </p:txBody>
-      </p:sp>
-      <p:sp>
-        <p:nvSpPr>
-          <p:cNvPr id="108" name="TextBox 107"/>
-          <p:cNvSpPr txBox="1"/>
-          <p:nvPr/>
-        </p:nvSpPr>
-        <p:spPr>
-          <a:xfrm>
-            <a:off x="4613564" y="5082642"/>
-            <a:ext cx="1308115" cy="369332"/>
-          </a:xfrm>
-          <a:prstGeom prst="rect">
-            <a:avLst/>
-          </a:prstGeom>
-          <a:noFill/>
-        </p:spPr>
-        <p:txBody>
-          <a:bodyPr wrap="none" rtlCol="0">
-            <a:spAutoFit/>
-          </a:bodyPr>
-          <a:lstStyle/>
-          <a:p>
-            <a:r>
-              <a:rPr lang="sr-Latn-RS" dirty="0"/>
-              <a:t>š</a:t>
-            </a:r>
-            <a:r>
-              <a:rPr lang="sr-Latn-RS" dirty="0" smtClean="0"/>
-              <a:t>ifra_usluge</a:t>
-            </a:r>
-            <a:endParaRPr lang="en-US" dirty="0"/>
-          </a:p>
-        </p:txBody>
-      </p:sp>
-      <p:sp>
-        <p:nvSpPr>
           <p:cNvPr id="109" name="TextBox 108"/>
           <p:cNvSpPr txBox="1"/>
           <p:nvPr/>
         </p:nvSpPr>
         <p:spPr>
           <a:xfrm>
-            <a:off x="4610028" y="5399676"/>
+            <a:off x="4610028" y="4696940"/>
             <a:ext cx="1224502" cy="369332"/>
           </a:xfrm>
           <a:prstGeom prst="rect">
@@ -7595,73 +7510,7 @@
         </p:nvCxnSpPr>
         <p:spPr>
           <a:xfrm>
-            <a:off x="4267200" y="5277920"/>
-            <a:ext cx="374073" cy="1355"/>
-          </a:xfrm>
-          <a:prstGeom prst="straightConnector1">
-            <a:avLst/>
-          </a:prstGeom>
-          <a:ln>
-            <a:tailEnd type="triangle"/>
-          </a:ln>
-        </p:spPr>
-        <p:style>
-          <a:lnRef idx="1">
-            <a:schemeClr val="accent1"/>
-          </a:lnRef>
-          <a:fillRef idx="0">
-            <a:schemeClr val="accent1"/>
-          </a:fillRef>
-          <a:effectRef idx="0">
-            <a:schemeClr val="accent1"/>
-          </a:effectRef>
-          <a:fontRef idx="minor">
-            <a:schemeClr val="tx1"/>
-          </a:fontRef>
-        </p:style>
-      </p:cxnSp>
-      <p:cxnSp>
-        <p:nvCxnSpPr>
-          <p:cNvPr id="116" name="Straight Arrow Connector 115"/>
-          <p:cNvCxnSpPr/>
-          <p:nvPr/>
-        </p:nvCxnSpPr>
-        <p:spPr>
-          <a:xfrm>
-            <a:off x="4267199" y="5602115"/>
-            <a:ext cx="374073" cy="1355"/>
-          </a:xfrm>
-          <a:prstGeom prst="straightConnector1">
-            <a:avLst/>
-          </a:prstGeom>
-          <a:ln>
-            <a:tailEnd type="triangle"/>
-          </a:ln>
-        </p:spPr>
-        <p:style>
-          <a:lnRef idx="1">
-            <a:schemeClr val="accent1"/>
-          </a:lnRef>
-          <a:fillRef idx="0">
-            <a:schemeClr val="accent1"/>
-          </a:fillRef>
-          <a:effectRef idx="0">
-            <a:schemeClr val="accent1"/>
-          </a:effectRef>
-          <a:fontRef idx="minor">
-            <a:schemeClr val="tx1"/>
-          </a:fontRef>
-        </p:style>
-      </p:cxnSp>
-      <p:cxnSp>
-        <p:nvCxnSpPr>
-          <p:cNvPr id="117" name="Straight Arrow Connector 116"/>
-          <p:cNvCxnSpPr/>
-          <p:nvPr/>
-        </p:nvCxnSpPr>
-        <p:spPr>
-          <a:xfrm>
-            <a:off x="4267199" y="5926314"/>
+            <a:off x="4275667" y="5277920"/>
             <a:ext cx="374073" cy="1355"/>
           </a:xfrm>
           <a:prstGeom prst="straightConnector1">
@@ -7693,201 +7542,9 @@
           <p:nvPr/>
         </p:nvCxnSpPr>
         <p:spPr>
-          <a:xfrm flipV="1">
-            <a:off x="4267202" y="3869073"/>
-            <a:ext cx="322" cy="2065554"/>
-          </a:xfrm>
-          <a:prstGeom prst="line">
-            <a:avLst/>
-          </a:prstGeom>
-        </p:spPr>
-        <p:style>
-          <a:lnRef idx="1">
-            <a:schemeClr val="accent1"/>
-          </a:lnRef>
-          <a:fillRef idx="0">
-            <a:schemeClr val="accent1"/>
-          </a:fillRef>
-          <a:effectRef idx="0">
-            <a:schemeClr val="accent1"/>
-          </a:effectRef>
-          <a:fontRef idx="minor">
-            <a:schemeClr val="tx1"/>
-          </a:fontRef>
-        </p:style>
-      </p:cxnSp>
-      <p:cxnSp>
-        <p:nvCxnSpPr>
-          <p:cNvPr id="122" name="Straight Arrow Connector 121"/>
-          <p:cNvCxnSpPr>
-            <a:stCxn id="11" idx="3"/>
-          </p:cNvCxnSpPr>
-          <p:nvPr/>
-        </p:nvCxnSpPr>
-        <p:spPr>
-          <a:xfrm flipV="1">
-            <a:off x="1170054" y="4343611"/>
-            <a:ext cx="1180492" cy="1"/>
-          </a:xfrm>
-          <a:prstGeom prst="straightConnector1">
-            <a:avLst/>
-          </a:prstGeom>
-          <a:ln>
-            <a:tailEnd type="triangle"/>
-          </a:ln>
-        </p:spPr>
-        <p:style>
-          <a:lnRef idx="1">
-            <a:schemeClr val="accent1"/>
-          </a:lnRef>
-          <a:fillRef idx="0">
-            <a:schemeClr val="accent1"/>
-          </a:fillRef>
-          <a:effectRef idx="0">
-            <a:schemeClr val="accent1"/>
-          </a:effectRef>
-          <a:fontRef idx="minor">
-            <a:schemeClr val="tx1"/>
-          </a:fontRef>
-        </p:style>
-      </p:cxnSp>
-      <p:sp>
-        <p:nvSpPr>
-          <p:cNvPr id="123" name="TextBox 122"/>
-          <p:cNvSpPr txBox="1"/>
-          <p:nvPr/>
-        </p:nvSpPr>
-        <p:spPr>
-          <a:xfrm>
-            <a:off x="2327880" y="4537576"/>
-            <a:ext cx="1224502" cy="369332"/>
-          </a:xfrm>
-          <a:prstGeom prst="rect">
-            <a:avLst/>
-          </a:prstGeom>
-          <a:noFill/>
-        </p:spPr>
-        <p:txBody>
-          <a:bodyPr wrap="none" rtlCol="0">
-            <a:spAutoFit/>
-          </a:bodyPr>
-          <a:lstStyle/>
-          <a:p>
-            <a:r>
-              <a:rPr lang="sr-Latn-RS" dirty="0">
-                <a:solidFill>
-                  <a:srgbClr val="00B050"/>
-                </a:solidFill>
-              </a:rPr>
-              <a:t>p</a:t>
-            </a:r>
-            <a:r>
-              <a:rPr lang="sr-Latn-RS" dirty="0" smtClean="0">
-                <a:solidFill>
-                  <a:srgbClr val="00B050"/>
-                </a:solidFill>
-              </a:rPr>
-              <a:t>acijent_id</a:t>
-            </a:r>
-            <a:endParaRPr lang="en-US" dirty="0">
-              <a:solidFill>
-                <a:srgbClr val="00B050"/>
-              </a:solidFill>
-            </a:endParaRPr>
-          </a:p>
-        </p:txBody>
-      </p:sp>
-      <p:sp>
-        <p:nvSpPr>
-          <p:cNvPr id="124" name="TextBox 123"/>
-          <p:cNvSpPr txBox="1"/>
-          <p:nvPr/>
-        </p:nvSpPr>
-        <p:spPr>
-          <a:xfrm>
-            <a:off x="2328943" y="4858436"/>
-            <a:ext cx="1978490" cy="369332"/>
-          </a:xfrm>
-          <a:prstGeom prst="rect">
-            <a:avLst/>
-          </a:prstGeom>
-          <a:noFill/>
-        </p:spPr>
-        <p:txBody>
-          <a:bodyPr wrap="none" rtlCol="0">
-            <a:spAutoFit/>
-          </a:bodyPr>
-          <a:lstStyle/>
-          <a:p>
-            <a:r>
-              <a:rPr lang="sr-Latn-RS" dirty="0">
-                <a:solidFill>
-                  <a:srgbClr val="00B050"/>
-                </a:solidFill>
-              </a:rPr>
-              <a:t>i</a:t>
-            </a:r>
-            <a:r>
-              <a:rPr lang="sr-Latn-RS" dirty="0" smtClean="0">
-                <a:solidFill>
-                  <a:srgbClr val="00B050"/>
-                </a:solidFill>
-              </a:rPr>
-              <a:t>ntervencija_log_id</a:t>
-            </a:r>
-            <a:endParaRPr lang="en-US" dirty="0">
-              <a:solidFill>
-                <a:srgbClr val="00B050"/>
-              </a:solidFill>
-            </a:endParaRPr>
-          </a:p>
-        </p:txBody>
-      </p:sp>
-      <p:cxnSp>
-        <p:nvCxnSpPr>
-          <p:cNvPr id="129" name="Straight Arrow Connector 128"/>
-          <p:cNvCxnSpPr>
-            <a:endCxn id="124" idx="1"/>
-          </p:cNvCxnSpPr>
-          <p:nvPr/>
-        </p:nvCxnSpPr>
-        <p:spPr>
-          <a:xfrm>
-            <a:off x="1953491" y="5043102"/>
-            <a:ext cx="375452" cy="0"/>
-          </a:xfrm>
-          <a:prstGeom prst="straightConnector1">
-            <a:avLst/>
-          </a:prstGeom>
-          <a:ln>
-            <a:tailEnd type="triangle"/>
-          </a:ln>
-        </p:spPr>
-        <p:style>
-          <a:lnRef idx="1">
-            <a:schemeClr val="accent1"/>
-          </a:lnRef>
-          <a:fillRef idx="0">
-            <a:schemeClr val="accent1"/>
-          </a:fillRef>
-          <a:effectRef idx="0">
-            <a:schemeClr val="accent1"/>
-          </a:effectRef>
-          <a:fontRef idx="minor">
-            <a:schemeClr val="tx1"/>
-          </a:fontRef>
-        </p:style>
-      </p:cxnSp>
-      <p:cxnSp>
-        <p:nvCxnSpPr>
-          <p:cNvPr id="131" name="Straight Connector 130"/>
-          <p:cNvCxnSpPr/>
-          <p:nvPr/>
-        </p:nvCxnSpPr>
-        <p:spPr>
-          <a:xfrm flipV="1">
-            <a:off x="1953491" y="4344497"/>
-            <a:ext cx="0" cy="698605"/>
+          <a:xfrm flipH="1" flipV="1">
+            <a:off x="4267525" y="3869074"/>
+            <a:ext cx="9053" cy="1408846"/>
           </a:xfrm>
           <a:prstGeom prst="line">
             <a:avLst/>
@@ -8218,57 +7875,13 @@
       </p:sp>
       <p:sp>
         <p:nvSpPr>
-          <p:cNvPr id="140" name="TextBox 139"/>
-          <p:cNvSpPr txBox="1"/>
-          <p:nvPr/>
-        </p:nvSpPr>
-        <p:spPr>
-          <a:xfrm>
-            <a:off x="1196690" y="4038173"/>
-            <a:ext cx="876650" cy="369332"/>
-          </a:xfrm>
-          <a:prstGeom prst="rect">
-            <a:avLst/>
-          </a:prstGeom>
-          <a:noFill/>
-        </p:spPr>
-        <p:txBody>
-          <a:bodyPr wrap="none" rtlCol="0">
-            <a:spAutoFit/>
-          </a:bodyPr>
-          <a:lstStyle/>
-          <a:p>
-            <a:r>
-              <a:rPr lang="sr-Latn-RS" dirty="0" smtClean="0">
-                <a:solidFill>
-                  <a:schemeClr val="accent1">
-                    <a:lumMod val="60000"/>
-                    <a:lumOff val="40000"/>
-                  </a:schemeClr>
-                </a:solidFill>
-              </a:rPr>
-              <a:t>atributi</a:t>
-            </a:r>
-            <a:endParaRPr lang="en-US" dirty="0">
-              <a:solidFill>
-                <a:schemeClr val="accent1">
-                  <a:lumMod val="60000"/>
-                  <a:lumOff val="40000"/>
-                </a:schemeClr>
-              </a:solidFill>
-            </a:endParaRPr>
-          </a:p>
-        </p:txBody>
-      </p:sp>
-      <p:sp>
-        <p:nvSpPr>
           <p:cNvPr id="141" name="TextBox 140"/>
           <p:cNvSpPr txBox="1"/>
           <p:nvPr/>
         </p:nvSpPr>
         <p:spPr>
           <a:xfrm>
-            <a:off x="8030877" y="6129076"/>
+            <a:off x="8027628" y="6247715"/>
             <a:ext cx="1194814" cy="369332"/>
           </a:xfrm>
           <a:prstGeom prst="rect">
@@ -8314,7 +7927,7 @@
         </p:nvCxnSpPr>
         <p:spPr>
           <a:xfrm>
-            <a:off x="7710272" y="6339247"/>
+            <a:off x="7710272" y="6432381"/>
             <a:ext cx="339399" cy="0"/>
           </a:xfrm>
           <a:prstGeom prst="straightConnector1">
@@ -8426,7 +8039,7 @@
         </p:nvSpPr>
         <p:spPr>
           <a:xfrm>
-            <a:off x="4610026" y="5731413"/>
+            <a:off x="4610026" y="5071013"/>
             <a:ext cx="1002262" cy="369332"/>
           </a:xfrm>
           <a:prstGeom prst="rect">
@@ -8440,21 +8053,29 @@
           </a:bodyPr>
           <a:lstStyle/>
           <a:p>
-            <a:r>
-              <a:rPr lang="sr-Latn-RS" dirty="0">
-                <a:solidFill>
-                  <a:srgbClr val="00B050"/>
-                </a:solidFill>
-              </a:rPr>
-              <a:t>r</a:t>
-            </a:r>
             <a:r>
               <a:rPr lang="sr-Latn-RS" dirty="0" smtClean="0">
                 <a:solidFill>
                   <a:srgbClr val="00B050"/>
                 </a:solidFill>
               </a:rPr>
-              <a:t>ačun_id</a:t>
+              <a:t>ra</a:t>
+            </a:r>
+            <a:r>
+              <a:rPr lang="en-US" dirty="0" smtClean="0">
+                <a:solidFill>
+                  <a:srgbClr val="00B050"/>
+                </a:solidFill>
+              </a:rPr>
+              <a:t>c</a:t>
+            </a:r>
+            <a:r>
+              <a:rPr lang="sr-Latn-RS" dirty="0" smtClean="0">
+                <a:solidFill>
+                  <a:srgbClr val="00B050"/>
+                </a:solidFill>
+              </a:rPr>
+              <a:t>un_id</a:t>
             </a:r>
             <a:endParaRPr lang="en-US" dirty="0">
               <a:solidFill>
@@ -8641,84 +8262,13 @@
       </p:sp>
       <p:cxnSp>
         <p:nvCxnSpPr>
-          <p:cNvPr id="118" name="Straight Arrow Connector 117"/>
-          <p:cNvCxnSpPr/>
-          <p:nvPr/>
-        </p:nvCxnSpPr>
-        <p:spPr>
-          <a:xfrm>
-            <a:off x="1956260" y="4746615"/>
-            <a:ext cx="375452" cy="0"/>
-          </a:xfrm>
-          <a:prstGeom prst="straightConnector1">
-            <a:avLst/>
-          </a:prstGeom>
-          <a:ln>
-            <a:tailEnd type="triangle"/>
-          </a:ln>
-        </p:spPr>
-        <p:style>
-          <a:lnRef idx="1">
-            <a:schemeClr val="accent1"/>
-          </a:lnRef>
-          <a:fillRef idx="0">
-            <a:schemeClr val="accent1"/>
-          </a:fillRef>
-          <a:effectRef idx="0">
-            <a:schemeClr val="accent1"/>
-          </a:effectRef>
-          <a:fontRef idx="minor">
-            <a:schemeClr val="tx1"/>
-          </a:fontRef>
-        </p:style>
-      </p:cxnSp>
-      <p:sp>
-        <p:nvSpPr>
-          <p:cNvPr id="34" name="TextBox 33"/>
-          <p:cNvSpPr txBox="1"/>
-          <p:nvPr/>
-        </p:nvSpPr>
-        <p:spPr>
-          <a:xfrm>
-            <a:off x="2327880" y="4152639"/>
-            <a:ext cx="1084143" cy="369332"/>
-          </a:xfrm>
-          <a:prstGeom prst="rect">
-            <a:avLst/>
-          </a:prstGeom>
-          <a:noFill/>
-        </p:spPr>
-        <p:txBody>
-          <a:bodyPr wrap="none" rtlCol="0">
-            <a:spAutoFit/>
-          </a:bodyPr>
-          <a:lstStyle/>
-          <a:p>
-            <a:r>
-              <a:rPr lang="sr-Latn-RS" dirty="0" smtClean="0">
-                <a:solidFill>
-                  <a:srgbClr val="FF0000"/>
-                </a:solidFill>
-              </a:rPr>
-              <a:t>karton_id</a:t>
-            </a:r>
-            <a:endParaRPr lang="en-US" dirty="0">
-              <a:solidFill>
-                <a:srgbClr val="FF0000"/>
-              </a:solidFill>
-            </a:endParaRPr>
-          </a:p>
-        </p:txBody>
-      </p:sp>
-      <p:cxnSp>
-        <p:nvCxnSpPr>
           <p:cNvPr id="121" name="Straight Arrow Connector 120"/>
           <p:cNvCxnSpPr/>
           <p:nvPr/>
         </p:nvCxnSpPr>
         <p:spPr>
           <a:xfrm>
-            <a:off x="9911692" y="3032454"/>
+            <a:off x="9911692" y="3023987"/>
             <a:ext cx="209150" cy="0"/>
           </a:xfrm>
           <a:prstGeom prst="straightConnector1">
@@ -8980,8 +8530,8 @@
         </p:nvSpPr>
         <p:spPr>
           <a:xfrm>
-            <a:off x="4547058" y="3713168"/>
-            <a:ext cx="1580433" cy="307777"/>
+            <a:off x="4530124" y="3687767"/>
+            <a:ext cx="1542410" cy="338554"/>
           </a:xfrm>
           <a:prstGeom prst="rect">
             <a:avLst/>
@@ -8995,22 +8545,38 @@
           <a:lstStyle/>
           <a:p>
             <a:r>
-              <a:rPr lang="sr-Latn-RS" sz="1400" dirty="0">
+              <a:rPr lang="en-US" sz="1600" dirty="0" err="1" smtClean="0">
                 <a:solidFill>
                   <a:srgbClr val="FF0000"/>
                 </a:solidFill>
               </a:rPr>
-              <a:t>i</a:t>
-            </a:r>
-            <a:r>
-              <a:rPr lang="sr-Latn-RS" sz="1400" dirty="0" smtClean="0">
+              <a:t>racun</a:t>
+            </a:r>
+            <a:r>
+              <a:rPr lang="sr-Latn-RS" sz="1600" dirty="0" smtClean="0">
                 <a:solidFill>
                   <a:srgbClr val="FF0000"/>
                 </a:solidFill>
               </a:rPr>
-              <a:t>ntervencija_log_id</a:t>
-            </a:r>
-            <a:endParaRPr lang="en-US" sz="1400" dirty="0">
+              <a:t>_</a:t>
+            </a:r>
+            <a:r>
+              <a:rPr lang="en-US" sz="1600" dirty="0" err="1" smtClean="0">
+                <a:solidFill>
+                  <a:srgbClr val="FF0000"/>
+                </a:solidFill>
+              </a:rPr>
+              <a:t>usluga</a:t>
+            </a:r>
+            <a:r>
+              <a:rPr lang="sr-Latn-RS" sz="1600" dirty="0" smtClean="0">
+                <a:solidFill>
+                  <a:srgbClr val="FF0000"/>
+                </a:solidFill>
+              </a:rPr>
+              <a:t>_id</a:t>
+            </a:r>
+            <a:endParaRPr lang="en-US" sz="1600" dirty="0">
               <a:solidFill>
                 <a:srgbClr val="FF0000"/>
               </a:solidFill>
@@ -9193,7 +8759,7 @@
         </p:nvSpPr>
         <p:spPr>
           <a:xfrm>
-            <a:off x="10134371" y="5492596"/>
+            <a:off x="10134371" y="5966730"/>
             <a:ext cx="2097497" cy="369332"/>
           </a:xfrm>
           <a:prstGeom prst="rect">
@@ -9231,39 +8797,6 @@
           </a:p>
         </p:txBody>
       </p:sp>
-      <p:cxnSp>
-        <p:nvCxnSpPr>
-          <p:cNvPr id="128" name="Straight Arrow Connector 127"/>
-          <p:cNvCxnSpPr/>
-          <p:nvPr/>
-        </p:nvCxnSpPr>
-        <p:spPr>
-          <a:xfrm>
-            <a:off x="7710270" y="6577369"/>
-            <a:ext cx="339399" cy="0"/>
-          </a:xfrm>
-          <a:prstGeom prst="straightConnector1">
-            <a:avLst/>
-          </a:prstGeom>
-          <a:ln>
-            <a:tailEnd type="triangle"/>
-          </a:ln>
-        </p:spPr>
-        <p:style>
-          <a:lnRef idx="1">
-            <a:schemeClr val="accent1"/>
-          </a:lnRef>
-          <a:fillRef idx="0">
-            <a:schemeClr val="accent1"/>
-          </a:fillRef>
-          <a:effectRef idx="0">
-            <a:schemeClr val="accent1"/>
-          </a:effectRef>
-          <a:fontRef idx="minor">
-            <a:schemeClr val="tx1"/>
-          </a:fontRef>
-        </p:style>
-      </p:cxnSp>
       <p:sp>
         <p:nvSpPr>
           <p:cNvPr id="149" name="TextBox 148"/>
@@ -9272,7 +8805,7 @@
         </p:nvSpPr>
         <p:spPr>
           <a:xfrm>
-            <a:off x="8016222" y="6336142"/>
+            <a:off x="8023171" y="5495599"/>
             <a:ext cx="1708029" cy="569387"/>
           </a:xfrm>
           <a:prstGeom prst="rect">
@@ -10049,6 +9582,156 @@
               <a:t>email</a:t>
             </a:r>
             <a:endParaRPr lang="en-US" dirty="0"/>
+          </a:p>
+        </p:txBody>
+      </p:sp>
+      <p:cxnSp>
+        <p:nvCxnSpPr>
+          <p:cNvPr id="152" name="Straight Arrow Connector 151"/>
+          <p:cNvCxnSpPr/>
+          <p:nvPr/>
+        </p:nvCxnSpPr>
+        <p:spPr>
+          <a:xfrm>
+            <a:off x="9950947" y="5938184"/>
+            <a:ext cx="209150" cy="0"/>
+          </a:xfrm>
+          <a:prstGeom prst="straightConnector1">
+            <a:avLst/>
+          </a:prstGeom>
+          <a:ln>
+            <a:tailEnd type="triangle"/>
+          </a:ln>
+        </p:spPr>
+        <p:style>
+          <a:lnRef idx="1">
+            <a:schemeClr val="accent1"/>
+          </a:lnRef>
+          <a:fillRef idx="0">
+            <a:schemeClr val="accent1"/>
+          </a:fillRef>
+          <a:effectRef idx="0">
+            <a:schemeClr val="accent1"/>
+          </a:effectRef>
+          <a:fontRef idx="minor">
+            <a:schemeClr val="tx1"/>
+          </a:fontRef>
+        </p:style>
+      </p:cxnSp>
+      <p:cxnSp>
+        <p:nvCxnSpPr>
+          <p:cNvPr id="174" name="Straight Arrow Connector 173"/>
+          <p:cNvCxnSpPr/>
+          <p:nvPr/>
+        </p:nvCxnSpPr>
+        <p:spPr>
+          <a:xfrm>
+            <a:off x="9959414" y="6149851"/>
+            <a:ext cx="209150" cy="0"/>
+          </a:xfrm>
+          <a:prstGeom prst="straightConnector1">
+            <a:avLst/>
+          </a:prstGeom>
+          <a:ln>
+            <a:tailEnd type="triangle"/>
+          </a:ln>
+        </p:spPr>
+        <p:style>
+          <a:lnRef idx="1">
+            <a:schemeClr val="accent1"/>
+          </a:lnRef>
+          <a:fillRef idx="0">
+            <a:schemeClr val="accent1"/>
+          </a:fillRef>
+          <a:effectRef idx="0">
+            <a:schemeClr val="accent1"/>
+          </a:effectRef>
+          <a:fontRef idx="minor">
+            <a:schemeClr val="tx1"/>
+          </a:fontRef>
+        </p:style>
+      </p:cxnSp>
+      <p:sp>
+        <p:nvSpPr>
+          <p:cNvPr id="175" name="TextBox 174"/>
+          <p:cNvSpPr txBox="1"/>
+          <p:nvPr/>
+        </p:nvSpPr>
+        <p:spPr>
+          <a:xfrm>
+            <a:off x="10127516" y="5544254"/>
+            <a:ext cx="1731693" cy="292388"/>
+          </a:xfrm>
+          <a:prstGeom prst="rect">
+            <a:avLst/>
+          </a:prstGeom>
+          <a:noFill/>
+        </p:spPr>
+        <p:txBody>
+          <a:bodyPr wrap="none" rtlCol="0">
+            <a:spAutoFit/>
+          </a:bodyPr>
+          <a:lstStyle/>
+          <a:p>
+            <a:r>
+              <a:rPr lang="en-US" sz="1300" dirty="0"/>
+              <a:t>c</a:t>
+            </a:r>
+            <a:r>
+              <a:rPr lang="sr-Latn-RS" sz="1300" dirty="0" smtClean="0"/>
+              <a:t>ena</a:t>
+            </a:r>
+            <a:r>
+              <a:rPr lang="en-US" sz="1300" dirty="0" smtClean="0"/>
+              <a:t>_</a:t>
+            </a:r>
+            <a:r>
+              <a:rPr lang="en-US" sz="1300" dirty="0" err="1" smtClean="0"/>
+              <a:t>paket_penzioner</a:t>
+            </a:r>
+            <a:endParaRPr lang="en-US" sz="1300" dirty="0"/>
+          </a:p>
+        </p:txBody>
+      </p:sp>
+      <p:sp>
+        <p:nvSpPr>
+          <p:cNvPr id="176" name="TextBox 175"/>
+          <p:cNvSpPr txBox="1"/>
+          <p:nvPr/>
+        </p:nvSpPr>
+        <p:spPr>
+          <a:xfrm>
+            <a:off x="10136961" y="5770507"/>
+            <a:ext cx="1413592" cy="292388"/>
+          </a:xfrm>
+          <a:prstGeom prst="rect">
+            <a:avLst/>
+          </a:prstGeom>
+          <a:noFill/>
+        </p:spPr>
+        <p:txBody>
+          <a:bodyPr wrap="none" rtlCol="0">
+            <a:spAutoFit/>
+          </a:bodyPr>
+          <a:lstStyle/>
+          <a:p>
+            <a:r>
+              <a:rPr lang="en-US" sz="1300" dirty="0"/>
+              <a:t>c</a:t>
+            </a:r>
+            <a:r>
+              <a:rPr lang="sr-Latn-RS" sz="1300" dirty="0" smtClean="0"/>
+              <a:t>ena</a:t>
+            </a:r>
+            <a:r>
+              <a:rPr lang="en-US" sz="1300" dirty="0" smtClean="0"/>
+              <a:t>_</a:t>
+            </a:r>
+            <a:r>
+              <a:rPr lang="en-US" sz="1300" dirty="0" err="1" smtClean="0"/>
+              <a:t>paket_ostali</a:t>
+            </a:r>
+            <a:endParaRPr lang="en-US" sz="1300" dirty="0" smtClean="0"/>
           </a:p>
         </p:txBody>
       </p:sp>
@@ -10369,7 +10052,15 @@
           <a:p>
             <a:r>
               <a:rPr lang="sr-Latn-RS" dirty="0" smtClean="0"/>
-              <a:t>račun</a:t>
+              <a:t>ra</a:t>
+            </a:r>
+            <a:r>
+              <a:rPr lang="en-US" dirty="0" smtClean="0"/>
+              <a:t>c</a:t>
+            </a:r>
+            <a:r>
+              <a:rPr lang="sr-Latn-RS" dirty="0" smtClean="0"/>
+              <a:t>un</a:t>
             </a:r>
             <a:endParaRPr lang="en-US" dirty="0"/>
           </a:p>
@@ -10383,8 +10074,8 @@
         </p:nvSpPr>
         <p:spPr>
           <a:xfrm>
-            <a:off x="3449783" y="4417630"/>
-            <a:ext cx="1688347" cy="369332"/>
+            <a:off x="3585253" y="4417630"/>
+            <a:ext cx="1429174" cy="369332"/>
           </a:xfrm>
           <a:prstGeom prst="rect">
             <a:avLst/>
@@ -10408,12 +10099,16 @@
           <a:lstStyle/>
           <a:p>
             <a:r>
-              <a:rPr lang="sr-Latn-RS" dirty="0"/>
-              <a:t>i</a:t>
+              <a:rPr lang="en-US" dirty="0" err="1" smtClean="0"/>
+              <a:t>racun</a:t>
             </a:r>
             <a:r>
               <a:rPr lang="sr-Latn-RS" dirty="0" smtClean="0"/>
-              <a:t>ntervencija_log</a:t>
+              <a:t>_</a:t>
+            </a:r>
+            <a:r>
+              <a:rPr lang="en-US" dirty="0" err="1" smtClean="0"/>
+              <a:t>usluga</a:t>
             </a:r>
             <a:endParaRPr lang="en-US" dirty="0"/>
           </a:p>
@@ -10421,14 +10116,1032 @@
       </p:sp>
       <p:sp>
         <p:nvSpPr>
-          <p:cNvPr id="11" name="TextBox 10"/>
-          <p:cNvSpPr txBox="1"/>
-          <p:nvPr/>
-        </p:nvSpPr>
-        <p:spPr>
-          <a:xfrm>
-            <a:off x="8179723" y="3507974"/>
-            <a:ext cx="794000" cy="369332"/>
+          <p:cNvPr id="12" name="Flowchart: Decision 11"/>
+          <p:cNvSpPr/>
+          <p:nvPr/>
+        </p:nvSpPr>
+        <p:spPr>
+          <a:xfrm>
+            <a:off x="5323195" y="2061921"/>
+            <a:ext cx="1124258" cy="406337"/>
+          </a:xfrm>
+          <a:prstGeom prst="flowChartDecision">
+            <a:avLst/>
+          </a:prstGeom>
+        </p:spPr>
+        <p:style>
+          <a:lnRef idx="2">
+            <a:schemeClr val="accent1">
+              <a:shade val="50000"/>
+            </a:schemeClr>
+          </a:lnRef>
+          <a:fillRef idx="1">
+            <a:schemeClr val="accent1"/>
+          </a:fillRef>
+          <a:effectRef idx="0">
+            <a:schemeClr val="accent1"/>
+          </a:effectRef>
+          <a:fontRef idx="minor">
+            <a:schemeClr val="lt1"/>
+          </a:fontRef>
+        </p:style>
+        <p:txBody>
+          <a:bodyPr rtlCol="0" anchor="ctr"/>
+          <a:lstStyle/>
+          <a:p>
+            <a:pPr algn="ctr"/>
+            <a:r>
+              <a:rPr lang="en-US" dirty="0"/>
+              <a:t>m</a:t>
+            </a:r>
+            <a:r>
+              <a:rPr lang="sr-Latn-RS" dirty="0" smtClean="0"/>
+              <a:t>:1</a:t>
+            </a:r>
+            <a:endParaRPr lang="en-US" dirty="0"/>
+          </a:p>
+        </p:txBody>
+      </p:sp>
+      <p:sp>
+        <p:nvSpPr>
+          <p:cNvPr id="13" name="Flowchart: Decision 12"/>
+          <p:cNvSpPr/>
+          <p:nvPr/>
+        </p:nvSpPr>
+        <p:spPr>
+          <a:xfrm>
+            <a:off x="4512734" y="1299553"/>
+            <a:ext cx="1094964" cy="385959"/>
+          </a:xfrm>
+          <a:prstGeom prst="flowChartDecision">
+            <a:avLst/>
+          </a:prstGeom>
+        </p:spPr>
+        <p:style>
+          <a:lnRef idx="2">
+            <a:schemeClr val="accent1">
+              <a:shade val="50000"/>
+            </a:schemeClr>
+          </a:lnRef>
+          <a:fillRef idx="1">
+            <a:schemeClr val="accent1"/>
+          </a:fillRef>
+          <a:effectRef idx="0">
+            <a:schemeClr val="accent1"/>
+          </a:effectRef>
+          <a:fontRef idx="minor">
+            <a:schemeClr val="lt1"/>
+          </a:fontRef>
+        </p:style>
+        <p:txBody>
+          <a:bodyPr rtlCol="0" anchor="ctr"/>
+          <a:lstStyle/>
+          <a:p>
+            <a:pPr algn="ctr"/>
+            <a:r>
+              <a:rPr lang="sr-Latn-RS" dirty="0" smtClean="0"/>
+              <a:t>1:</a:t>
+            </a:r>
+            <a:r>
+              <a:rPr lang="en-US" dirty="0" smtClean="0"/>
+              <a:t>m</a:t>
+            </a:r>
+            <a:endParaRPr lang="en-US" dirty="0"/>
+          </a:p>
+        </p:txBody>
+      </p:sp>
+      <p:sp>
+        <p:nvSpPr>
+          <p:cNvPr id="16" name="Flowchart: Decision 15"/>
+          <p:cNvSpPr/>
+          <p:nvPr/>
+        </p:nvSpPr>
+        <p:spPr>
+          <a:xfrm>
+            <a:off x="8700842" y="5872357"/>
+            <a:ext cx="1112467" cy="443776"/>
+          </a:xfrm>
+          <a:prstGeom prst="flowChartDecision">
+            <a:avLst/>
+          </a:prstGeom>
+        </p:spPr>
+        <p:style>
+          <a:lnRef idx="2">
+            <a:schemeClr val="accent1">
+              <a:shade val="50000"/>
+            </a:schemeClr>
+          </a:lnRef>
+          <a:fillRef idx="1">
+            <a:schemeClr val="accent1"/>
+          </a:fillRef>
+          <a:effectRef idx="0">
+            <a:schemeClr val="accent1"/>
+          </a:effectRef>
+          <a:fontRef idx="minor">
+            <a:schemeClr val="lt1"/>
+          </a:fontRef>
+        </p:style>
+        <p:txBody>
+          <a:bodyPr rtlCol="0" anchor="ctr"/>
+          <a:lstStyle/>
+          <a:p>
+            <a:pPr algn="ctr"/>
+            <a:r>
+              <a:rPr lang="en-US" dirty="0"/>
+              <a:t>m</a:t>
+            </a:r>
+            <a:r>
+              <a:rPr lang="sr-Latn-RS" dirty="0" smtClean="0"/>
+              <a:t>:1</a:t>
+            </a:r>
+            <a:endParaRPr lang="en-US" dirty="0"/>
+          </a:p>
+        </p:txBody>
+      </p:sp>
+      <p:sp>
+        <p:nvSpPr>
+          <p:cNvPr id="17" name="Flowchart: Decision 16"/>
+          <p:cNvSpPr/>
+          <p:nvPr/>
+        </p:nvSpPr>
+        <p:spPr>
+          <a:xfrm>
+            <a:off x="3728142" y="3651076"/>
+            <a:ext cx="1133107" cy="385959"/>
+          </a:xfrm>
+          <a:prstGeom prst="flowChartDecision">
+            <a:avLst/>
+          </a:prstGeom>
+        </p:spPr>
+        <p:style>
+          <a:lnRef idx="2">
+            <a:schemeClr val="accent1">
+              <a:shade val="50000"/>
+            </a:schemeClr>
+          </a:lnRef>
+          <a:fillRef idx="1">
+            <a:schemeClr val="accent1"/>
+          </a:fillRef>
+          <a:effectRef idx="0">
+            <a:schemeClr val="accent1"/>
+          </a:effectRef>
+          <a:fontRef idx="minor">
+            <a:schemeClr val="lt1"/>
+          </a:fontRef>
+        </p:style>
+        <p:txBody>
+          <a:bodyPr rtlCol="0" anchor="ctr"/>
+          <a:lstStyle/>
+          <a:p>
+            <a:pPr algn="ctr"/>
+            <a:r>
+              <a:rPr lang="sr-Latn-RS" dirty="0" smtClean="0"/>
+              <a:t>1:m</a:t>
+            </a:r>
+            <a:endParaRPr lang="en-US" dirty="0"/>
+          </a:p>
+        </p:txBody>
+      </p:sp>
+      <p:sp>
+        <p:nvSpPr>
+          <p:cNvPr id="18" name="Flowchart: Decision 17"/>
+          <p:cNvSpPr/>
+          <p:nvPr/>
+        </p:nvSpPr>
+        <p:spPr>
+          <a:xfrm>
+            <a:off x="778931" y="2803356"/>
+            <a:ext cx="1181250" cy="423476"/>
+          </a:xfrm>
+          <a:prstGeom prst="flowChartDecision">
+            <a:avLst/>
+          </a:prstGeom>
+        </p:spPr>
+        <p:style>
+          <a:lnRef idx="2">
+            <a:schemeClr val="accent1">
+              <a:shade val="50000"/>
+            </a:schemeClr>
+          </a:lnRef>
+          <a:fillRef idx="1">
+            <a:schemeClr val="accent1"/>
+          </a:fillRef>
+          <a:effectRef idx="0">
+            <a:schemeClr val="accent1"/>
+          </a:effectRef>
+          <a:fontRef idx="minor">
+            <a:schemeClr val="lt1"/>
+          </a:fontRef>
+        </p:style>
+        <p:txBody>
+          <a:bodyPr rtlCol="0" anchor="ctr"/>
+          <a:lstStyle/>
+          <a:p>
+            <a:pPr algn="ctr"/>
+            <a:r>
+              <a:rPr lang="sr-Latn-RS" dirty="0" smtClean="0"/>
+              <a:t>1:</a:t>
+            </a:r>
+            <a:r>
+              <a:rPr lang="en-US" dirty="0" smtClean="0"/>
+              <a:t>m</a:t>
+            </a:r>
+            <a:endParaRPr lang="en-US" dirty="0"/>
+          </a:p>
+        </p:txBody>
+      </p:sp>
+      <p:sp>
+        <p:nvSpPr>
+          <p:cNvPr id="19" name="Flowchart: Decision 18"/>
+          <p:cNvSpPr/>
+          <p:nvPr/>
+        </p:nvSpPr>
+        <p:spPr>
+          <a:xfrm>
+            <a:off x="1907250" y="4420398"/>
+            <a:ext cx="1119967" cy="385959"/>
+          </a:xfrm>
+          <a:prstGeom prst="flowChartDecision">
+            <a:avLst/>
+          </a:prstGeom>
+        </p:spPr>
+        <p:style>
+          <a:lnRef idx="2">
+            <a:schemeClr val="accent1">
+              <a:shade val="50000"/>
+            </a:schemeClr>
+          </a:lnRef>
+          <a:fillRef idx="1">
+            <a:schemeClr val="accent1"/>
+          </a:fillRef>
+          <a:effectRef idx="0">
+            <a:schemeClr val="accent1"/>
+          </a:effectRef>
+          <a:fontRef idx="minor">
+            <a:schemeClr val="lt1"/>
+          </a:fontRef>
+        </p:style>
+        <p:txBody>
+          <a:bodyPr rtlCol="0" anchor="ctr"/>
+          <a:lstStyle/>
+          <a:p>
+            <a:pPr algn="ctr"/>
+            <a:r>
+              <a:rPr lang="sr-Latn-RS" dirty="0" smtClean="0"/>
+              <a:t>1:m</a:t>
+            </a:r>
+            <a:endParaRPr lang="en-US" dirty="0"/>
+          </a:p>
+        </p:txBody>
+      </p:sp>
+      <p:sp>
+        <p:nvSpPr>
+          <p:cNvPr id="20" name="Flowchart: Decision 19"/>
+          <p:cNvSpPr/>
+          <p:nvPr/>
+        </p:nvSpPr>
+        <p:spPr>
+          <a:xfrm>
+            <a:off x="1907250" y="5676421"/>
+            <a:ext cx="1119967" cy="385959"/>
+          </a:xfrm>
+          <a:prstGeom prst="flowChartDecision">
+            <a:avLst/>
+          </a:prstGeom>
+        </p:spPr>
+        <p:style>
+          <a:lnRef idx="2">
+            <a:schemeClr val="accent1">
+              <a:shade val="50000"/>
+            </a:schemeClr>
+          </a:lnRef>
+          <a:fillRef idx="1">
+            <a:schemeClr val="accent1"/>
+          </a:fillRef>
+          <a:effectRef idx="0">
+            <a:schemeClr val="accent1"/>
+          </a:effectRef>
+          <a:fontRef idx="minor">
+            <a:schemeClr val="lt1"/>
+          </a:fontRef>
+        </p:style>
+        <p:txBody>
+          <a:bodyPr rtlCol="0" anchor="ctr"/>
+          <a:lstStyle/>
+          <a:p>
+            <a:pPr algn="ctr"/>
+            <a:r>
+              <a:rPr lang="sr-Latn-RS" dirty="0" smtClean="0"/>
+              <a:t>1:m</a:t>
+            </a:r>
+            <a:endParaRPr lang="en-US" dirty="0"/>
+          </a:p>
+        </p:txBody>
+      </p:sp>
+      <p:cxnSp>
+        <p:nvCxnSpPr>
+          <p:cNvPr id="22" name="Straight Connector 21"/>
+          <p:cNvCxnSpPr>
+            <a:stCxn id="4" idx="3"/>
+            <a:endCxn id="13" idx="1"/>
+          </p:cNvCxnSpPr>
+          <p:nvPr/>
+        </p:nvCxnSpPr>
+        <p:spPr>
+          <a:xfrm flipV="1">
+            <a:off x="1834703" y="1492533"/>
+            <a:ext cx="2678031" cy="4777"/>
+          </a:xfrm>
+          <a:prstGeom prst="line">
+            <a:avLst/>
+          </a:prstGeom>
+        </p:spPr>
+        <p:style>
+          <a:lnRef idx="1">
+            <a:schemeClr val="accent1"/>
+          </a:lnRef>
+          <a:fillRef idx="0">
+            <a:schemeClr val="accent1"/>
+          </a:fillRef>
+          <a:effectRef idx="0">
+            <a:schemeClr val="accent1"/>
+          </a:effectRef>
+          <a:fontRef idx="minor">
+            <a:schemeClr val="tx1"/>
+          </a:fontRef>
+        </p:style>
+      </p:cxnSp>
+      <p:cxnSp>
+        <p:nvCxnSpPr>
+          <p:cNvPr id="25" name="Straight Connector 24"/>
+          <p:cNvCxnSpPr>
+            <a:stCxn id="13" idx="3"/>
+          </p:cNvCxnSpPr>
+          <p:nvPr/>
+        </p:nvCxnSpPr>
+        <p:spPr>
+          <a:xfrm>
+            <a:off x="5607698" y="1492533"/>
+            <a:ext cx="2964389" cy="0"/>
+          </a:xfrm>
+          <a:prstGeom prst="line">
+            <a:avLst/>
+          </a:prstGeom>
+        </p:spPr>
+        <p:style>
+          <a:lnRef idx="1">
+            <a:schemeClr val="accent1"/>
+          </a:lnRef>
+          <a:fillRef idx="0">
+            <a:schemeClr val="accent1"/>
+          </a:fillRef>
+          <a:effectRef idx="0">
+            <a:schemeClr val="accent1"/>
+          </a:effectRef>
+          <a:fontRef idx="minor">
+            <a:schemeClr val="tx1"/>
+          </a:fontRef>
+        </p:style>
+      </p:cxnSp>
+      <p:cxnSp>
+        <p:nvCxnSpPr>
+          <p:cNvPr id="27" name="Straight Connector 26"/>
+          <p:cNvCxnSpPr>
+            <a:stCxn id="8" idx="0"/>
+          </p:cNvCxnSpPr>
+          <p:nvPr/>
+        </p:nvCxnSpPr>
+        <p:spPr>
+          <a:xfrm flipV="1">
+            <a:off x="8572087" y="1492532"/>
+            <a:ext cx="0" cy="586016"/>
+          </a:xfrm>
+          <a:prstGeom prst="line">
+            <a:avLst/>
+          </a:prstGeom>
+        </p:spPr>
+        <p:style>
+          <a:lnRef idx="1">
+            <a:schemeClr val="accent1"/>
+          </a:lnRef>
+          <a:fillRef idx="0">
+            <a:schemeClr val="accent1"/>
+          </a:fillRef>
+          <a:effectRef idx="0">
+            <a:schemeClr val="accent1"/>
+          </a:effectRef>
+          <a:fontRef idx="minor">
+            <a:schemeClr val="tx1"/>
+          </a:fontRef>
+        </p:style>
+      </p:cxnSp>
+      <p:cxnSp>
+        <p:nvCxnSpPr>
+          <p:cNvPr id="29" name="Straight Connector 28"/>
+          <p:cNvCxnSpPr>
+            <a:stCxn id="4" idx="2"/>
+            <a:endCxn id="18" idx="0"/>
+          </p:cNvCxnSpPr>
+          <p:nvPr/>
+        </p:nvCxnSpPr>
+        <p:spPr>
+          <a:xfrm flipH="1">
+            <a:off x="1369556" y="1681976"/>
+            <a:ext cx="12812" cy="1121380"/>
+          </a:xfrm>
+          <a:prstGeom prst="line">
+            <a:avLst/>
+          </a:prstGeom>
+        </p:spPr>
+        <p:style>
+          <a:lnRef idx="1">
+            <a:schemeClr val="accent1"/>
+          </a:lnRef>
+          <a:fillRef idx="0">
+            <a:schemeClr val="accent1"/>
+          </a:fillRef>
+          <a:effectRef idx="0">
+            <a:schemeClr val="accent1"/>
+          </a:effectRef>
+          <a:fontRef idx="minor">
+            <a:schemeClr val="tx1"/>
+          </a:fontRef>
+        </p:style>
+      </p:cxnSp>
+      <p:cxnSp>
+        <p:nvCxnSpPr>
+          <p:cNvPr id="31" name="Straight Connector 30"/>
+          <p:cNvCxnSpPr>
+            <a:stCxn id="18" idx="3"/>
+            <a:endCxn id="9" idx="1"/>
+          </p:cNvCxnSpPr>
+          <p:nvPr/>
+        </p:nvCxnSpPr>
+        <p:spPr>
+          <a:xfrm flipV="1">
+            <a:off x="1960181" y="2994367"/>
+            <a:ext cx="1971739" cy="20727"/>
+          </a:xfrm>
+          <a:prstGeom prst="line">
+            <a:avLst/>
+          </a:prstGeom>
+        </p:spPr>
+        <p:style>
+          <a:lnRef idx="1">
+            <a:schemeClr val="accent1"/>
+          </a:lnRef>
+          <a:fillRef idx="0">
+            <a:schemeClr val="accent1"/>
+          </a:fillRef>
+          <a:effectRef idx="0">
+            <a:schemeClr val="accent1"/>
+          </a:effectRef>
+          <a:fontRef idx="minor">
+            <a:schemeClr val="tx1"/>
+          </a:fontRef>
+        </p:style>
+      </p:cxnSp>
+      <p:cxnSp>
+        <p:nvCxnSpPr>
+          <p:cNvPr id="33" name="Straight Connector 32"/>
+          <p:cNvCxnSpPr>
+            <a:stCxn id="12" idx="3"/>
+            <a:endCxn id="8" idx="1"/>
+          </p:cNvCxnSpPr>
+          <p:nvPr/>
+        </p:nvCxnSpPr>
+        <p:spPr>
+          <a:xfrm flipV="1">
+            <a:off x="6447453" y="2263214"/>
+            <a:ext cx="1657455" cy="1876"/>
+          </a:xfrm>
+          <a:prstGeom prst="line">
+            <a:avLst/>
+          </a:prstGeom>
+        </p:spPr>
+        <p:style>
+          <a:lnRef idx="1">
+            <a:schemeClr val="accent1"/>
+          </a:lnRef>
+          <a:fillRef idx="0">
+            <a:schemeClr val="accent1"/>
+          </a:fillRef>
+          <a:effectRef idx="0">
+            <a:schemeClr val="accent1"/>
+          </a:effectRef>
+          <a:fontRef idx="minor">
+            <a:schemeClr val="tx1"/>
+          </a:fontRef>
+        </p:style>
+      </p:cxnSp>
+      <p:cxnSp>
+        <p:nvCxnSpPr>
+          <p:cNvPr id="35" name="Straight Connector 34"/>
+          <p:cNvCxnSpPr>
+            <a:stCxn id="12" idx="1"/>
+          </p:cNvCxnSpPr>
+          <p:nvPr/>
+        </p:nvCxnSpPr>
+        <p:spPr>
+          <a:xfrm flipH="1">
+            <a:off x="4287979" y="2265090"/>
+            <a:ext cx="1035216" cy="9739"/>
+          </a:xfrm>
+          <a:prstGeom prst="line">
+            <a:avLst/>
+          </a:prstGeom>
+        </p:spPr>
+        <p:style>
+          <a:lnRef idx="1">
+            <a:schemeClr val="accent1"/>
+          </a:lnRef>
+          <a:fillRef idx="0">
+            <a:schemeClr val="accent1"/>
+          </a:fillRef>
+          <a:effectRef idx="0">
+            <a:schemeClr val="accent1"/>
+          </a:effectRef>
+          <a:fontRef idx="minor">
+            <a:schemeClr val="tx1"/>
+          </a:fontRef>
+        </p:style>
+      </p:cxnSp>
+      <p:cxnSp>
+        <p:nvCxnSpPr>
+          <p:cNvPr id="37" name="Straight Connector 36"/>
+          <p:cNvCxnSpPr>
+            <a:stCxn id="9" idx="0"/>
+          </p:cNvCxnSpPr>
+          <p:nvPr/>
+        </p:nvCxnSpPr>
+        <p:spPr>
+          <a:xfrm flipV="1">
+            <a:off x="4287979" y="2274829"/>
+            <a:ext cx="0" cy="534872"/>
+          </a:xfrm>
+          <a:prstGeom prst="line">
+            <a:avLst/>
+          </a:prstGeom>
+        </p:spPr>
+        <p:style>
+          <a:lnRef idx="1">
+            <a:schemeClr val="accent1"/>
+          </a:lnRef>
+          <a:fillRef idx="0">
+            <a:schemeClr val="accent1"/>
+          </a:fillRef>
+          <a:effectRef idx="0">
+            <a:schemeClr val="accent1"/>
+          </a:effectRef>
+          <a:fontRef idx="minor">
+            <a:schemeClr val="tx1"/>
+          </a:fontRef>
+        </p:style>
+      </p:cxnSp>
+      <p:cxnSp>
+        <p:nvCxnSpPr>
+          <p:cNvPr id="40" name="Straight Connector 39"/>
+          <p:cNvCxnSpPr>
+            <a:stCxn id="9" idx="2"/>
+            <a:endCxn id="17" idx="0"/>
+          </p:cNvCxnSpPr>
+          <p:nvPr/>
+        </p:nvCxnSpPr>
+        <p:spPr>
+          <a:xfrm>
+            <a:off x="4287979" y="3179033"/>
+            <a:ext cx="6717" cy="472043"/>
+          </a:xfrm>
+          <a:prstGeom prst="line">
+            <a:avLst/>
+          </a:prstGeom>
+        </p:spPr>
+        <p:style>
+          <a:lnRef idx="1">
+            <a:schemeClr val="accent1"/>
+          </a:lnRef>
+          <a:fillRef idx="0">
+            <a:schemeClr val="accent1"/>
+          </a:fillRef>
+          <a:effectRef idx="0">
+            <a:schemeClr val="accent1"/>
+          </a:effectRef>
+          <a:fontRef idx="minor">
+            <a:schemeClr val="tx1"/>
+          </a:fontRef>
+        </p:style>
+      </p:cxnSp>
+      <p:cxnSp>
+        <p:nvCxnSpPr>
+          <p:cNvPr id="42" name="Straight Connector 41"/>
+          <p:cNvCxnSpPr>
+            <a:stCxn id="17" idx="2"/>
+            <a:endCxn id="10" idx="0"/>
+          </p:cNvCxnSpPr>
+          <p:nvPr/>
+        </p:nvCxnSpPr>
+        <p:spPr>
+          <a:xfrm>
+            <a:off x="4294696" y="4037035"/>
+            <a:ext cx="5144" cy="380595"/>
+          </a:xfrm>
+          <a:prstGeom prst="line">
+            <a:avLst/>
+          </a:prstGeom>
+        </p:spPr>
+        <p:style>
+          <a:lnRef idx="1">
+            <a:schemeClr val="accent1"/>
+          </a:lnRef>
+          <a:fillRef idx="0">
+            <a:schemeClr val="accent1"/>
+          </a:fillRef>
+          <a:effectRef idx="0">
+            <a:schemeClr val="accent1"/>
+          </a:effectRef>
+          <a:fontRef idx="minor">
+            <a:schemeClr val="tx1"/>
+          </a:fontRef>
+        </p:style>
+      </p:cxnSp>
+      <p:cxnSp>
+        <p:nvCxnSpPr>
+          <p:cNvPr id="44" name="Straight Connector 43"/>
+          <p:cNvCxnSpPr>
+            <a:stCxn id="6" idx="3"/>
+            <a:endCxn id="19" idx="1"/>
+          </p:cNvCxnSpPr>
+          <p:nvPr/>
+        </p:nvCxnSpPr>
+        <p:spPr>
+          <a:xfrm flipV="1">
+            <a:off x="1248485" y="4613378"/>
+            <a:ext cx="658765" cy="8313"/>
+          </a:xfrm>
+          <a:prstGeom prst="line">
+            <a:avLst/>
+          </a:prstGeom>
+        </p:spPr>
+        <p:style>
+          <a:lnRef idx="1">
+            <a:schemeClr val="accent1"/>
+          </a:lnRef>
+          <a:fillRef idx="0">
+            <a:schemeClr val="accent1"/>
+          </a:fillRef>
+          <a:effectRef idx="0">
+            <a:schemeClr val="accent1"/>
+          </a:effectRef>
+          <a:fontRef idx="minor">
+            <a:schemeClr val="tx1"/>
+          </a:fontRef>
+        </p:style>
+      </p:cxnSp>
+      <p:cxnSp>
+        <p:nvCxnSpPr>
+          <p:cNvPr id="46" name="Straight Connector 45"/>
+          <p:cNvCxnSpPr>
+            <a:stCxn id="19" idx="3"/>
+            <a:endCxn id="10" idx="1"/>
+          </p:cNvCxnSpPr>
+          <p:nvPr/>
+        </p:nvCxnSpPr>
+        <p:spPr>
+          <a:xfrm flipV="1">
+            <a:off x="3027217" y="4602296"/>
+            <a:ext cx="558036" cy="11082"/>
+          </a:xfrm>
+          <a:prstGeom prst="line">
+            <a:avLst/>
+          </a:prstGeom>
+        </p:spPr>
+        <p:style>
+          <a:lnRef idx="1">
+            <a:schemeClr val="accent1"/>
+          </a:lnRef>
+          <a:fillRef idx="0">
+            <a:schemeClr val="accent1"/>
+          </a:fillRef>
+          <a:effectRef idx="0">
+            <a:schemeClr val="accent1"/>
+          </a:effectRef>
+          <a:fontRef idx="minor">
+            <a:schemeClr val="tx1"/>
+          </a:fontRef>
+        </p:style>
+      </p:cxnSp>
+      <p:cxnSp>
+        <p:nvCxnSpPr>
+          <p:cNvPr id="62" name="Straight Connector 61"/>
+          <p:cNvCxnSpPr>
+            <a:stCxn id="7" idx="3"/>
+            <a:endCxn id="20" idx="1"/>
+          </p:cNvCxnSpPr>
+          <p:nvPr/>
+        </p:nvCxnSpPr>
+        <p:spPr>
+          <a:xfrm>
+            <a:off x="980719" y="5869401"/>
+            <a:ext cx="926531" cy="0"/>
+          </a:xfrm>
+          <a:prstGeom prst="line">
+            <a:avLst/>
+          </a:prstGeom>
+        </p:spPr>
+        <p:style>
+          <a:lnRef idx="1">
+            <a:schemeClr val="accent1"/>
+          </a:lnRef>
+          <a:fillRef idx="0">
+            <a:schemeClr val="accent1"/>
+          </a:fillRef>
+          <a:effectRef idx="0">
+            <a:schemeClr val="accent1"/>
+          </a:effectRef>
+          <a:fontRef idx="minor">
+            <a:schemeClr val="tx1"/>
+          </a:fontRef>
+        </p:style>
+      </p:cxnSp>
+      <p:cxnSp>
+        <p:nvCxnSpPr>
+          <p:cNvPr id="64" name="Straight Connector 63"/>
+          <p:cNvCxnSpPr>
+            <a:stCxn id="20" idx="3"/>
+          </p:cNvCxnSpPr>
+          <p:nvPr/>
+        </p:nvCxnSpPr>
+        <p:spPr>
+          <a:xfrm>
+            <a:off x="3027217" y="5869401"/>
+            <a:ext cx="803562" cy="0"/>
+          </a:xfrm>
+          <a:prstGeom prst="line">
+            <a:avLst/>
+          </a:prstGeom>
+        </p:spPr>
+        <p:style>
+          <a:lnRef idx="1">
+            <a:schemeClr val="accent1"/>
+          </a:lnRef>
+          <a:fillRef idx="0">
+            <a:schemeClr val="accent1"/>
+          </a:fillRef>
+          <a:effectRef idx="0">
+            <a:schemeClr val="accent1"/>
+          </a:effectRef>
+          <a:fontRef idx="minor">
+            <a:schemeClr val="tx1"/>
+          </a:fontRef>
+        </p:style>
+      </p:cxnSp>
+      <p:cxnSp>
+        <p:nvCxnSpPr>
+          <p:cNvPr id="66" name="Straight Connector 65"/>
+          <p:cNvCxnSpPr/>
+          <p:nvPr/>
+        </p:nvCxnSpPr>
+        <p:spPr>
+          <a:xfrm flipV="1">
+            <a:off x="3830779" y="4786962"/>
+            <a:ext cx="0" cy="1082438"/>
+          </a:xfrm>
+          <a:prstGeom prst="line">
+            <a:avLst/>
+          </a:prstGeom>
+        </p:spPr>
+        <p:style>
+          <a:lnRef idx="1">
+            <a:schemeClr val="accent1"/>
+          </a:lnRef>
+          <a:fillRef idx="0">
+            <a:schemeClr val="accent1"/>
+          </a:fillRef>
+          <a:effectRef idx="0">
+            <a:schemeClr val="accent1"/>
+          </a:effectRef>
+          <a:fontRef idx="minor">
+            <a:schemeClr val="tx1"/>
+          </a:fontRef>
+        </p:style>
+      </p:cxnSp>
+      <p:cxnSp>
+        <p:nvCxnSpPr>
+          <p:cNvPr id="68" name="Straight Connector 67"/>
+          <p:cNvCxnSpPr/>
+          <p:nvPr/>
+        </p:nvCxnSpPr>
+        <p:spPr>
+          <a:xfrm flipH="1">
+            <a:off x="4285489" y="4786962"/>
+            <a:ext cx="1" cy="1275418"/>
+          </a:xfrm>
+          <a:prstGeom prst="line">
+            <a:avLst/>
+          </a:prstGeom>
+        </p:spPr>
+        <p:style>
+          <a:lnRef idx="1">
+            <a:schemeClr val="accent1"/>
+          </a:lnRef>
+          <a:fillRef idx="0">
+            <a:schemeClr val="accent1"/>
+          </a:fillRef>
+          <a:effectRef idx="0">
+            <a:schemeClr val="accent1"/>
+          </a:effectRef>
+          <a:fontRef idx="minor">
+            <a:schemeClr val="tx1"/>
+          </a:fontRef>
+        </p:style>
+      </p:cxnSp>
+      <p:cxnSp>
+        <p:nvCxnSpPr>
+          <p:cNvPr id="70" name="Straight Connector 69"/>
+          <p:cNvCxnSpPr>
+            <a:stCxn id="16" idx="1"/>
+          </p:cNvCxnSpPr>
+          <p:nvPr/>
+        </p:nvCxnSpPr>
+        <p:spPr>
+          <a:xfrm flipH="1" flipV="1">
+            <a:off x="4287982" y="6062381"/>
+            <a:ext cx="4412860" cy="31864"/>
+          </a:xfrm>
+          <a:prstGeom prst="line">
+            <a:avLst/>
+          </a:prstGeom>
+        </p:spPr>
+        <p:style>
+          <a:lnRef idx="1">
+            <a:schemeClr val="accent1"/>
+          </a:lnRef>
+          <a:fillRef idx="0">
+            <a:schemeClr val="accent1"/>
+          </a:fillRef>
+          <a:effectRef idx="0">
+            <a:schemeClr val="accent1"/>
+          </a:effectRef>
+          <a:fontRef idx="minor">
+            <a:schemeClr val="tx1"/>
+          </a:fontRef>
+        </p:style>
+      </p:cxnSp>
+      <p:cxnSp>
+        <p:nvCxnSpPr>
+          <p:cNvPr id="73" name="Straight Connector 72"/>
+          <p:cNvCxnSpPr>
+            <a:stCxn id="8" idx="3"/>
+          </p:cNvCxnSpPr>
+          <p:nvPr/>
+        </p:nvCxnSpPr>
+        <p:spPr>
+          <a:xfrm flipV="1">
+            <a:off x="9039266" y="2242666"/>
+            <a:ext cx="2324513" cy="20548"/>
+          </a:xfrm>
+          <a:prstGeom prst="line">
+            <a:avLst/>
+          </a:prstGeom>
+        </p:spPr>
+        <p:style>
+          <a:lnRef idx="1">
+            <a:schemeClr val="accent1"/>
+          </a:lnRef>
+          <a:fillRef idx="0">
+            <a:schemeClr val="accent1"/>
+          </a:fillRef>
+          <a:effectRef idx="0">
+            <a:schemeClr val="accent1"/>
+          </a:effectRef>
+          <a:fontRef idx="minor">
+            <a:schemeClr val="tx1"/>
+          </a:fontRef>
+        </p:style>
+      </p:cxnSp>
+      <p:cxnSp>
+        <p:nvCxnSpPr>
+          <p:cNvPr id="75" name="Straight Connector 74"/>
+          <p:cNvCxnSpPr>
+            <a:stCxn id="16" idx="3"/>
+          </p:cNvCxnSpPr>
+          <p:nvPr/>
+        </p:nvCxnSpPr>
+        <p:spPr>
+          <a:xfrm>
+            <a:off x="9813309" y="6094245"/>
+            <a:ext cx="1550470" cy="0"/>
+          </a:xfrm>
+          <a:prstGeom prst="line">
+            <a:avLst/>
+          </a:prstGeom>
+        </p:spPr>
+        <p:style>
+          <a:lnRef idx="1">
+            <a:schemeClr val="accent1"/>
+          </a:lnRef>
+          <a:fillRef idx="0">
+            <a:schemeClr val="accent1"/>
+          </a:fillRef>
+          <a:effectRef idx="0">
+            <a:schemeClr val="accent1"/>
+          </a:effectRef>
+          <a:fontRef idx="minor">
+            <a:schemeClr val="tx1"/>
+          </a:fontRef>
+        </p:style>
+      </p:cxnSp>
+      <p:cxnSp>
+        <p:nvCxnSpPr>
+          <p:cNvPr id="78" name="Straight Connector 77"/>
+          <p:cNvCxnSpPr/>
+          <p:nvPr/>
+        </p:nvCxnSpPr>
+        <p:spPr>
+          <a:xfrm flipH="1" flipV="1">
+            <a:off x="11353800" y="2242667"/>
+            <a:ext cx="9979" cy="3851578"/>
+          </a:xfrm>
+          <a:prstGeom prst="line">
+            <a:avLst/>
+          </a:prstGeom>
+        </p:spPr>
+        <p:style>
+          <a:lnRef idx="1">
+            <a:schemeClr val="accent1"/>
+          </a:lnRef>
+          <a:fillRef idx="0">
+            <a:schemeClr val="accent1"/>
+          </a:fillRef>
+          <a:effectRef idx="0">
+            <a:schemeClr val="accent1"/>
+          </a:effectRef>
+          <a:fontRef idx="minor">
+            <a:schemeClr val="tx1"/>
+          </a:fontRef>
+        </p:style>
+      </p:cxnSp>
+      <p:sp>
+        <p:nvSpPr>
+          <p:cNvPr id="80" name="Rectangle 79"/>
+          <p:cNvSpPr/>
+          <p:nvPr/>
+        </p:nvSpPr>
+        <p:spPr>
+          <a:xfrm>
+            <a:off x="195943" y="141317"/>
+            <a:ext cx="642257" cy="284235"/>
+          </a:xfrm>
+          <a:prstGeom prst="rect">
+            <a:avLst/>
+          </a:prstGeom>
+          <a:solidFill>
+            <a:schemeClr val="accent2">
+              <a:lumMod val="40000"/>
+              <a:lumOff val="60000"/>
+            </a:schemeClr>
+          </a:solidFill>
+          <a:ln w="31750">
+            <a:solidFill>
+              <a:schemeClr val="tx1"/>
+            </a:solidFill>
+          </a:ln>
+        </p:spPr>
+        <p:style>
+          <a:lnRef idx="2">
+            <a:schemeClr val="accent1">
+              <a:shade val="50000"/>
+            </a:schemeClr>
+          </a:lnRef>
+          <a:fillRef idx="1">
+            <a:schemeClr val="accent1"/>
+          </a:fillRef>
+          <a:effectRef idx="0">
+            <a:schemeClr val="accent1"/>
+          </a:effectRef>
+          <a:fontRef idx="minor">
+            <a:schemeClr val="lt1"/>
+          </a:fontRef>
+        </p:style>
+        <p:txBody>
+          <a:bodyPr rtlCol="0" anchor="ctr"/>
+          <a:lstStyle/>
+          <a:p>
+            <a:pPr algn="ctr"/>
+            <a:endParaRPr lang="en-US"/>
+          </a:p>
+        </p:txBody>
+      </p:sp>
+      <p:sp>
+        <p:nvSpPr>
+          <p:cNvPr id="81" name="Rectangle 80"/>
+          <p:cNvSpPr/>
+          <p:nvPr/>
+        </p:nvSpPr>
+        <p:spPr>
+          <a:xfrm>
+            <a:off x="195942" y="584863"/>
+            <a:ext cx="642257" cy="284235"/>
           </a:xfrm>
           <a:prstGeom prst="rect">
             <a:avLst/>
@@ -10445,1304 +11158,6 @@
             </a:solidFill>
           </a:ln>
         </p:spPr>
-        <p:txBody>
-          <a:bodyPr wrap="none" rtlCol="0">
-            <a:spAutoFit/>
-          </a:bodyPr>
-          <a:lstStyle/>
-          <a:p>
-            <a:r>
-              <a:rPr lang="sr-Latn-RS" dirty="0"/>
-              <a:t>k</a:t>
-            </a:r>
-            <a:r>
-              <a:rPr lang="sr-Latn-RS" dirty="0" smtClean="0"/>
-              <a:t>arton</a:t>
-            </a:r>
-          </a:p>
-        </p:txBody>
-      </p:sp>
-      <p:sp>
-        <p:nvSpPr>
-          <p:cNvPr id="12" name="Flowchart: Decision 11"/>
-          <p:cNvSpPr/>
-          <p:nvPr/>
-        </p:nvSpPr>
-        <p:spPr>
-          <a:xfrm>
-            <a:off x="5453149" y="2061921"/>
-            <a:ext cx="994304" cy="385959"/>
-          </a:xfrm>
-          <a:prstGeom prst="flowChartDecision">
-            <a:avLst/>
-          </a:prstGeom>
-        </p:spPr>
-        <p:style>
-          <a:lnRef idx="2">
-            <a:schemeClr val="accent1">
-              <a:shade val="50000"/>
-            </a:schemeClr>
-          </a:lnRef>
-          <a:fillRef idx="1">
-            <a:schemeClr val="accent1"/>
-          </a:fillRef>
-          <a:effectRef idx="0">
-            <a:schemeClr val="accent1"/>
-          </a:effectRef>
-          <a:fontRef idx="minor">
-            <a:schemeClr val="lt1"/>
-          </a:fontRef>
-        </p:style>
-        <p:txBody>
-          <a:bodyPr rtlCol="0" anchor="ctr"/>
-          <a:lstStyle/>
-          <a:p>
-            <a:pPr algn="ctr"/>
-            <a:r>
-              <a:rPr lang="sr-Latn-RS" dirty="0" smtClean="0"/>
-              <a:t>1:1</a:t>
-            </a:r>
-            <a:endParaRPr lang="en-US" dirty="0"/>
-          </a:p>
-        </p:txBody>
-      </p:sp>
-      <p:sp>
-        <p:nvSpPr>
-          <p:cNvPr id="13" name="Flowchart: Decision 12"/>
-          <p:cNvSpPr/>
-          <p:nvPr/>
-        </p:nvSpPr>
-        <p:spPr>
-          <a:xfrm>
-            <a:off x="4599708" y="1299553"/>
-            <a:ext cx="1007989" cy="385959"/>
-          </a:xfrm>
-          <a:prstGeom prst="flowChartDecision">
-            <a:avLst/>
-          </a:prstGeom>
-        </p:spPr>
-        <p:style>
-          <a:lnRef idx="2">
-            <a:schemeClr val="accent1">
-              <a:shade val="50000"/>
-            </a:schemeClr>
-          </a:lnRef>
-          <a:fillRef idx="1">
-            <a:schemeClr val="accent1"/>
-          </a:fillRef>
-          <a:effectRef idx="0">
-            <a:schemeClr val="accent1"/>
-          </a:effectRef>
-          <a:fontRef idx="minor">
-            <a:schemeClr val="lt1"/>
-          </a:fontRef>
-        </p:style>
-        <p:txBody>
-          <a:bodyPr rtlCol="0" anchor="ctr"/>
-          <a:lstStyle/>
-          <a:p>
-            <a:pPr algn="ctr"/>
-            <a:r>
-              <a:rPr lang="sr-Latn-RS" dirty="0" smtClean="0"/>
-              <a:t>1:1</a:t>
-            </a:r>
-            <a:endParaRPr lang="en-US" dirty="0"/>
-          </a:p>
-        </p:txBody>
-      </p:sp>
-      <p:sp>
-        <p:nvSpPr>
-          <p:cNvPr id="14" name="Flowchart: Decision 13"/>
-          <p:cNvSpPr/>
-          <p:nvPr/>
-        </p:nvSpPr>
-        <p:spPr>
-          <a:xfrm>
-            <a:off x="8056770" y="2803357"/>
-            <a:ext cx="1028500" cy="385959"/>
-          </a:xfrm>
-          <a:prstGeom prst="flowChartDecision">
-            <a:avLst/>
-          </a:prstGeom>
-        </p:spPr>
-        <p:style>
-          <a:lnRef idx="2">
-            <a:schemeClr val="accent1">
-              <a:shade val="50000"/>
-            </a:schemeClr>
-          </a:lnRef>
-          <a:fillRef idx="1">
-            <a:schemeClr val="accent1"/>
-          </a:fillRef>
-          <a:effectRef idx="0">
-            <a:schemeClr val="accent1"/>
-          </a:effectRef>
-          <a:fontRef idx="minor">
-            <a:schemeClr val="lt1"/>
-          </a:fontRef>
-        </p:style>
-        <p:txBody>
-          <a:bodyPr rtlCol="0" anchor="ctr"/>
-          <a:lstStyle/>
-          <a:p>
-            <a:pPr algn="ctr"/>
-            <a:r>
-              <a:rPr lang="sr-Latn-RS" dirty="0" smtClean="0"/>
-              <a:t>1:1</a:t>
-            </a:r>
-            <a:endParaRPr lang="en-US" dirty="0"/>
-          </a:p>
-        </p:txBody>
-      </p:sp>
-      <p:sp>
-        <p:nvSpPr>
-          <p:cNvPr id="15" name="Flowchart: Decision 14"/>
-          <p:cNvSpPr/>
-          <p:nvPr/>
-        </p:nvSpPr>
-        <p:spPr>
-          <a:xfrm>
-            <a:off x="6674034" y="4401003"/>
-            <a:ext cx="973675" cy="385959"/>
-          </a:xfrm>
-          <a:prstGeom prst="flowChartDecision">
-            <a:avLst/>
-          </a:prstGeom>
-        </p:spPr>
-        <p:style>
-          <a:lnRef idx="2">
-            <a:schemeClr val="accent1">
-              <a:shade val="50000"/>
-            </a:schemeClr>
-          </a:lnRef>
-          <a:fillRef idx="1">
-            <a:schemeClr val="accent1"/>
-          </a:fillRef>
-          <a:effectRef idx="0">
-            <a:schemeClr val="accent1"/>
-          </a:effectRef>
-          <a:fontRef idx="minor">
-            <a:schemeClr val="lt1"/>
-          </a:fontRef>
-        </p:style>
-        <p:txBody>
-          <a:bodyPr rtlCol="0" anchor="ctr"/>
-          <a:lstStyle/>
-          <a:p>
-            <a:pPr algn="ctr"/>
-            <a:r>
-              <a:rPr lang="sr-Latn-RS" dirty="0" smtClean="0"/>
-              <a:t>1:1</a:t>
-            </a:r>
-            <a:endParaRPr lang="en-US" dirty="0"/>
-          </a:p>
-        </p:txBody>
-      </p:sp>
-      <p:sp>
-        <p:nvSpPr>
-          <p:cNvPr id="16" name="Flowchart: Decision 15"/>
-          <p:cNvSpPr/>
-          <p:nvPr/>
-        </p:nvSpPr>
-        <p:spPr>
-          <a:xfrm>
-            <a:off x="8826759" y="5872357"/>
-            <a:ext cx="986549" cy="385959"/>
-          </a:xfrm>
-          <a:prstGeom prst="flowChartDecision">
-            <a:avLst/>
-          </a:prstGeom>
-        </p:spPr>
-        <p:style>
-          <a:lnRef idx="2">
-            <a:schemeClr val="accent1">
-              <a:shade val="50000"/>
-            </a:schemeClr>
-          </a:lnRef>
-          <a:fillRef idx="1">
-            <a:schemeClr val="accent1"/>
-          </a:fillRef>
-          <a:effectRef idx="0">
-            <a:schemeClr val="accent1"/>
-          </a:effectRef>
-          <a:fontRef idx="minor">
-            <a:schemeClr val="lt1"/>
-          </a:fontRef>
-        </p:style>
-        <p:txBody>
-          <a:bodyPr rtlCol="0" anchor="ctr"/>
-          <a:lstStyle/>
-          <a:p>
-            <a:pPr algn="ctr"/>
-            <a:r>
-              <a:rPr lang="sr-Latn-RS" dirty="0" smtClean="0"/>
-              <a:t>1:1</a:t>
-            </a:r>
-            <a:endParaRPr lang="en-US" dirty="0"/>
-          </a:p>
-        </p:txBody>
-      </p:sp>
-      <p:sp>
-        <p:nvSpPr>
-          <p:cNvPr id="17" name="Flowchart: Decision 16"/>
-          <p:cNvSpPr/>
-          <p:nvPr/>
-        </p:nvSpPr>
-        <p:spPr>
-          <a:xfrm>
-            <a:off x="3728142" y="3651076"/>
-            <a:ext cx="1133107" cy="385959"/>
-          </a:xfrm>
-          <a:prstGeom prst="flowChartDecision">
-            <a:avLst/>
-          </a:prstGeom>
-        </p:spPr>
-        <p:style>
-          <a:lnRef idx="2">
-            <a:schemeClr val="accent1">
-              <a:shade val="50000"/>
-            </a:schemeClr>
-          </a:lnRef>
-          <a:fillRef idx="1">
-            <a:schemeClr val="accent1"/>
-          </a:fillRef>
-          <a:effectRef idx="0">
-            <a:schemeClr val="accent1"/>
-          </a:effectRef>
-          <a:fontRef idx="minor">
-            <a:schemeClr val="lt1"/>
-          </a:fontRef>
-        </p:style>
-        <p:txBody>
-          <a:bodyPr rtlCol="0" anchor="ctr"/>
-          <a:lstStyle/>
-          <a:p>
-            <a:pPr algn="ctr"/>
-            <a:r>
-              <a:rPr lang="sr-Latn-RS" dirty="0" smtClean="0"/>
-              <a:t>1:m</a:t>
-            </a:r>
-            <a:endParaRPr lang="en-US" dirty="0"/>
-          </a:p>
-        </p:txBody>
-      </p:sp>
-      <p:sp>
-        <p:nvSpPr>
-          <p:cNvPr id="18" name="Flowchart: Decision 17"/>
-          <p:cNvSpPr/>
-          <p:nvPr/>
-        </p:nvSpPr>
-        <p:spPr>
-          <a:xfrm>
-            <a:off x="897174" y="2803356"/>
-            <a:ext cx="982083" cy="385959"/>
-          </a:xfrm>
-          <a:prstGeom prst="flowChartDecision">
-            <a:avLst/>
-          </a:prstGeom>
-        </p:spPr>
-        <p:style>
-          <a:lnRef idx="2">
-            <a:schemeClr val="accent1">
-              <a:shade val="50000"/>
-            </a:schemeClr>
-          </a:lnRef>
-          <a:fillRef idx="1">
-            <a:schemeClr val="accent1"/>
-          </a:fillRef>
-          <a:effectRef idx="0">
-            <a:schemeClr val="accent1"/>
-          </a:effectRef>
-          <a:fontRef idx="minor">
-            <a:schemeClr val="lt1"/>
-          </a:fontRef>
-        </p:style>
-        <p:txBody>
-          <a:bodyPr rtlCol="0" anchor="ctr"/>
-          <a:lstStyle/>
-          <a:p>
-            <a:pPr algn="ctr"/>
-            <a:r>
-              <a:rPr lang="sr-Latn-RS" dirty="0" smtClean="0"/>
-              <a:t>1:1</a:t>
-            </a:r>
-            <a:endParaRPr lang="en-US" dirty="0"/>
-          </a:p>
-        </p:txBody>
-      </p:sp>
-      <p:sp>
-        <p:nvSpPr>
-          <p:cNvPr id="19" name="Flowchart: Decision 18"/>
-          <p:cNvSpPr/>
-          <p:nvPr/>
-        </p:nvSpPr>
-        <p:spPr>
-          <a:xfrm>
-            <a:off x="1907250" y="4420398"/>
-            <a:ext cx="1119967" cy="385959"/>
-          </a:xfrm>
-          <a:prstGeom prst="flowChartDecision">
-            <a:avLst/>
-          </a:prstGeom>
-        </p:spPr>
-        <p:style>
-          <a:lnRef idx="2">
-            <a:schemeClr val="accent1">
-              <a:shade val="50000"/>
-            </a:schemeClr>
-          </a:lnRef>
-          <a:fillRef idx="1">
-            <a:schemeClr val="accent1"/>
-          </a:fillRef>
-          <a:effectRef idx="0">
-            <a:schemeClr val="accent1"/>
-          </a:effectRef>
-          <a:fontRef idx="minor">
-            <a:schemeClr val="lt1"/>
-          </a:fontRef>
-        </p:style>
-        <p:txBody>
-          <a:bodyPr rtlCol="0" anchor="ctr"/>
-          <a:lstStyle/>
-          <a:p>
-            <a:pPr algn="ctr"/>
-            <a:r>
-              <a:rPr lang="sr-Latn-RS" dirty="0" smtClean="0"/>
-              <a:t>1:m</a:t>
-            </a:r>
-            <a:endParaRPr lang="en-US" dirty="0"/>
-          </a:p>
-        </p:txBody>
-      </p:sp>
-      <p:sp>
-        <p:nvSpPr>
-          <p:cNvPr id="20" name="Flowchart: Decision 19"/>
-          <p:cNvSpPr/>
-          <p:nvPr/>
-        </p:nvSpPr>
-        <p:spPr>
-          <a:xfrm>
-            <a:off x="1907250" y="5676421"/>
-            <a:ext cx="1119967" cy="385959"/>
-          </a:xfrm>
-          <a:prstGeom prst="flowChartDecision">
-            <a:avLst/>
-          </a:prstGeom>
-        </p:spPr>
-        <p:style>
-          <a:lnRef idx="2">
-            <a:schemeClr val="accent1">
-              <a:shade val="50000"/>
-            </a:schemeClr>
-          </a:lnRef>
-          <a:fillRef idx="1">
-            <a:schemeClr val="accent1"/>
-          </a:fillRef>
-          <a:effectRef idx="0">
-            <a:schemeClr val="accent1"/>
-          </a:effectRef>
-          <a:fontRef idx="minor">
-            <a:schemeClr val="lt1"/>
-          </a:fontRef>
-        </p:style>
-        <p:txBody>
-          <a:bodyPr rtlCol="0" anchor="ctr"/>
-          <a:lstStyle/>
-          <a:p>
-            <a:pPr algn="ctr"/>
-            <a:r>
-              <a:rPr lang="sr-Latn-RS" dirty="0" smtClean="0"/>
-              <a:t>1:m</a:t>
-            </a:r>
-            <a:endParaRPr lang="en-US" dirty="0"/>
-          </a:p>
-        </p:txBody>
-      </p:sp>
-      <p:cxnSp>
-        <p:nvCxnSpPr>
-          <p:cNvPr id="22" name="Straight Connector 21"/>
-          <p:cNvCxnSpPr>
-            <a:stCxn id="4" idx="3"/>
-            <a:endCxn id="13" idx="1"/>
-          </p:cNvCxnSpPr>
-          <p:nvPr/>
-        </p:nvCxnSpPr>
-        <p:spPr>
-          <a:xfrm flipV="1">
-            <a:off x="1834703" y="1492533"/>
-            <a:ext cx="2765005" cy="4777"/>
-          </a:xfrm>
-          <a:prstGeom prst="line">
-            <a:avLst/>
-          </a:prstGeom>
-        </p:spPr>
-        <p:style>
-          <a:lnRef idx="1">
-            <a:schemeClr val="accent1"/>
-          </a:lnRef>
-          <a:fillRef idx="0">
-            <a:schemeClr val="accent1"/>
-          </a:fillRef>
-          <a:effectRef idx="0">
-            <a:schemeClr val="accent1"/>
-          </a:effectRef>
-          <a:fontRef idx="minor">
-            <a:schemeClr val="tx1"/>
-          </a:fontRef>
-        </p:style>
-      </p:cxnSp>
-      <p:cxnSp>
-        <p:nvCxnSpPr>
-          <p:cNvPr id="25" name="Straight Connector 24"/>
-          <p:cNvCxnSpPr>
-            <a:stCxn id="13" idx="3"/>
-          </p:cNvCxnSpPr>
-          <p:nvPr/>
-        </p:nvCxnSpPr>
-        <p:spPr>
-          <a:xfrm>
-            <a:off x="5607697" y="1492533"/>
-            <a:ext cx="2964390" cy="0"/>
-          </a:xfrm>
-          <a:prstGeom prst="line">
-            <a:avLst/>
-          </a:prstGeom>
-        </p:spPr>
-        <p:style>
-          <a:lnRef idx="1">
-            <a:schemeClr val="accent1"/>
-          </a:lnRef>
-          <a:fillRef idx="0">
-            <a:schemeClr val="accent1"/>
-          </a:fillRef>
-          <a:effectRef idx="0">
-            <a:schemeClr val="accent1"/>
-          </a:effectRef>
-          <a:fontRef idx="minor">
-            <a:schemeClr val="tx1"/>
-          </a:fontRef>
-        </p:style>
-      </p:cxnSp>
-      <p:cxnSp>
-        <p:nvCxnSpPr>
-          <p:cNvPr id="27" name="Straight Connector 26"/>
-          <p:cNvCxnSpPr>
-            <a:stCxn id="8" idx="0"/>
-          </p:cNvCxnSpPr>
-          <p:nvPr/>
-        </p:nvCxnSpPr>
-        <p:spPr>
-          <a:xfrm flipV="1">
-            <a:off x="8572087" y="1492532"/>
-            <a:ext cx="0" cy="586016"/>
-          </a:xfrm>
-          <a:prstGeom prst="line">
-            <a:avLst/>
-          </a:prstGeom>
-        </p:spPr>
-        <p:style>
-          <a:lnRef idx="1">
-            <a:schemeClr val="accent1"/>
-          </a:lnRef>
-          <a:fillRef idx="0">
-            <a:schemeClr val="accent1"/>
-          </a:fillRef>
-          <a:effectRef idx="0">
-            <a:schemeClr val="accent1"/>
-          </a:effectRef>
-          <a:fontRef idx="minor">
-            <a:schemeClr val="tx1"/>
-          </a:fontRef>
-        </p:style>
-      </p:cxnSp>
-      <p:cxnSp>
-        <p:nvCxnSpPr>
-          <p:cNvPr id="29" name="Straight Connector 28"/>
-          <p:cNvCxnSpPr>
-            <a:stCxn id="4" idx="2"/>
-            <a:endCxn id="18" idx="0"/>
-          </p:cNvCxnSpPr>
-          <p:nvPr/>
-        </p:nvCxnSpPr>
-        <p:spPr>
-          <a:xfrm>
-            <a:off x="1382368" y="1681976"/>
-            <a:ext cx="5848" cy="1121380"/>
-          </a:xfrm>
-          <a:prstGeom prst="line">
-            <a:avLst/>
-          </a:prstGeom>
-        </p:spPr>
-        <p:style>
-          <a:lnRef idx="1">
-            <a:schemeClr val="accent1"/>
-          </a:lnRef>
-          <a:fillRef idx="0">
-            <a:schemeClr val="accent1"/>
-          </a:fillRef>
-          <a:effectRef idx="0">
-            <a:schemeClr val="accent1"/>
-          </a:effectRef>
-          <a:fontRef idx="minor">
-            <a:schemeClr val="tx1"/>
-          </a:fontRef>
-        </p:style>
-      </p:cxnSp>
-      <p:cxnSp>
-        <p:nvCxnSpPr>
-          <p:cNvPr id="31" name="Straight Connector 30"/>
-          <p:cNvCxnSpPr>
-            <a:stCxn id="18" idx="3"/>
-            <a:endCxn id="9" idx="1"/>
-          </p:cNvCxnSpPr>
-          <p:nvPr/>
-        </p:nvCxnSpPr>
-        <p:spPr>
-          <a:xfrm flipV="1">
-            <a:off x="1879257" y="2994367"/>
-            <a:ext cx="2052663" cy="1969"/>
-          </a:xfrm>
-          <a:prstGeom prst="line">
-            <a:avLst/>
-          </a:prstGeom>
-        </p:spPr>
-        <p:style>
-          <a:lnRef idx="1">
-            <a:schemeClr val="accent1"/>
-          </a:lnRef>
-          <a:fillRef idx="0">
-            <a:schemeClr val="accent1"/>
-          </a:fillRef>
-          <a:effectRef idx="0">
-            <a:schemeClr val="accent1"/>
-          </a:effectRef>
-          <a:fontRef idx="minor">
-            <a:schemeClr val="tx1"/>
-          </a:fontRef>
-        </p:style>
-      </p:cxnSp>
-      <p:cxnSp>
-        <p:nvCxnSpPr>
-          <p:cNvPr id="33" name="Straight Connector 32"/>
-          <p:cNvCxnSpPr>
-            <a:stCxn id="12" idx="3"/>
-            <a:endCxn id="8" idx="1"/>
-          </p:cNvCxnSpPr>
-          <p:nvPr/>
-        </p:nvCxnSpPr>
-        <p:spPr>
-          <a:xfrm>
-            <a:off x="6447453" y="2254901"/>
-            <a:ext cx="1657455" cy="8313"/>
-          </a:xfrm>
-          <a:prstGeom prst="line">
-            <a:avLst/>
-          </a:prstGeom>
-        </p:spPr>
-        <p:style>
-          <a:lnRef idx="1">
-            <a:schemeClr val="accent1"/>
-          </a:lnRef>
-          <a:fillRef idx="0">
-            <a:schemeClr val="accent1"/>
-          </a:fillRef>
-          <a:effectRef idx="0">
-            <a:schemeClr val="accent1"/>
-          </a:effectRef>
-          <a:fontRef idx="minor">
-            <a:schemeClr val="tx1"/>
-          </a:fontRef>
-        </p:style>
-      </p:cxnSp>
-      <p:cxnSp>
-        <p:nvCxnSpPr>
-          <p:cNvPr id="35" name="Straight Connector 34"/>
-          <p:cNvCxnSpPr>
-            <a:stCxn id="12" idx="1"/>
-          </p:cNvCxnSpPr>
-          <p:nvPr/>
-        </p:nvCxnSpPr>
-        <p:spPr>
-          <a:xfrm flipH="1">
-            <a:off x="4287979" y="2254901"/>
-            <a:ext cx="1165170" cy="19928"/>
-          </a:xfrm>
-          <a:prstGeom prst="line">
-            <a:avLst/>
-          </a:prstGeom>
-        </p:spPr>
-        <p:style>
-          <a:lnRef idx="1">
-            <a:schemeClr val="accent1"/>
-          </a:lnRef>
-          <a:fillRef idx="0">
-            <a:schemeClr val="accent1"/>
-          </a:fillRef>
-          <a:effectRef idx="0">
-            <a:schemeClr val="accent1"/>
-          </a:effectRef>
-          <a:fontRef idx="minor">
-            <a:schemeClr val="tx1"/>
-          </a:fontRef>
-        </p:style>
-      </p:cxnSp>
-      <p:cxnSp>
-        <p:nvCxnSpPr>
-          <p:cNvPr id="37" name="Straight Connector 36"/>
-          <p:cNvCxnSpPr>
-            <a:stCxn id="9" idx="0"/>
-          </p:cNvCxnSpPr>
-          <p:nvPr/>
-        </p:nvCxnSpPr>
-        <p:spPr>
-          <a:xfrm flipV="1">
-            <a:off x="4287979" y="2274829"/>
-            <a:ext cx="0" cy="534872"/>
-          </a:xfrm>
-          <a:prstGeom prst="line">
-            <a:avLst/>
-          </a:prstGeom>
-        </p:spPr>
-        <p:style>
-          <a:lnRef idx="1">
-            <a:schemeClr val="accent1"/>
-          </a:lnRef>
-          <a:fillRef idx="0">
-            <a:schemeClr val="accent1"/>
-          </a:fillRef>
-          <a:effectRef idx="0">
-            <a:schemeClr val="accent1"/>
-          </a:effectRef>
-          <a:fontRef idx="minor">
-            <a:schemeClr val="tx1"/>
-          </a:fontRef>
-        </p:style>
-      </p:cxnSp>
-      <p:cxnSp>
-        <p:nvCxnSpPr>
-          <p:cNvPr id="40" name="Straight Connector 39"/>
-          <p:cNvCxnSpPr>
-            <a:stCxn id="9" idx="2"/>
-            <a:endCxn id="17" idx="0"/>
-          </p:cNvCxnSpPr>
-          <p:nvPr/>
-        </p:nvCxnSpPr>
-        <p:spPr>
-          <a:xfrm>
-            <a:off x="4287979" y="3179033"/>
-            <a:ext cx="6717" cy="472043"/>
-          </a:xfrm>
-          <a:prstGeom prst="line">
-            <a:avLst/>
-          </a:prstGeom>
-        </p:spPr>
-        <p:style>
-          <a:lnRef idx="1">
-            <a:schemeClr val="accent1"/>
-          </a:lnRef>
-          <a:fillRef idx="0">
-            <a:schemeClr val="accent1"/>
-          </a:fillRef>
-          <a:effectRef idx="0">
-            <a:schemeClr val="accent1"/>
-          </a:effectRef>
-          <a:fontRef idx="minor">
-            <a:schemeClr val="tx1"/>
-          </a:fontRef>
-        </p:style>
-      </p:cxnSp>
-      <p:cxnSp>
-        <p:nvCxnSpPr>
-          <p:cNvPr id="42" name="Straight Connector 41"/>
-          <p:cNvCxnSpPr>
-            <a:stCxn id="17" idx="2"/>
-            <a:endCxn id="10" idx="0"/>
-          </p:cNvCxnSpPr>
-          <p:nvPr/>
-        </p:nvCxnSpPr>
-        <p:spPr>
-          <a:xfrm flipH="1">
-            <a:off x="4293957" y="4037035"/>
-            <a:ext cx="739" cy="380595"/>
-          </a:xfrm>
-          <a:prstGeom prst="line">
-            <a:avLst/>
-          </a:prstGeom>
-        </p:spPr>
-        <p:style>
-          <a:lnRef idx="1">
-            <a:schemeClr val="accent1"/>
-          </a:lnRef>
-          <a:fillRef idx="0">
-            <a:schemeClr val="accent1"/>
-          </a:fillRef>
-          <a:effectRef idx="0">
-            <a:schemeClr val="accent1"/>
-          </a:effectRef>
-          <a:fontRef idx="minor">
-            <a:schemeClr val="tx1"/>
-          </a:fontRef>
-        </p:style>
-      </p:cxnSp>
-      <p:cxnSp>
-        <p:nvCxnSpPr>
-          <p:cNvPr id="44" name="Straight Connector 43"/>
-          <p:cNvCxnSpPr>
-            <a:stCxn id="6" idx="3"/>
-            <a:endCxn id="19" idx="1"/>
-          </p:cNvCxnSpPr>
-          <p:nvPr/>
-        </p:nvCxnSpPr>
-        <p:spPr>
-          <a:xfrm flipV="1">
-            <a:off x="1248485" y="4613378"/>
-            <a:ext cx="658765" cy="8313"/>
-          </a:xfrm>
-          <a:prstGeom prst="line">
-            <a:avLst/>
-          </a:prstGeom>
-        </p:spPr>
-        <p:style>
-          <a:lnRef idx="1">
-            <a:schemeClr val="accent1"/>
-          </a:lnRef>
-          <a:fillRef idx="0">
-            <a:schemeClr val="accent1"/>
-          </a:fillRef>
-          <a:effectRef idx="0">
-            <a:schemeClr val="accent1"/>
-          </a:effectRef>
-          <a:fontRef idx="minor">
-            <a:schemeClr val="tx1"/>
-          </a:fontRef>
-        </p:style>
-      </p:cxnSp>
-      <p:cxnSp>
-        <p:nvCxnSpPr>
-          <p:cNvPr id="46" name="Straight Connector 45"/>
-          <p:cNvCxnSpPr>
-            <a:stCxn id="19" idx="3"/>
-            <a:endCxn id="10" idx="1"/>
-          </p:cNvCxnSpPr>
-          <p:nvPr/>
-        </p:nvCxnSpPr>
-        <p:spPr>
-          <a:xfrm flipV="1">
-            <a:off x="3027217" y="4602296"/>
-            <a:ext cx="422566" cy="11082"/>
-          </a:xfrm>
-          <a:prstGeom prst="line">
-            <a:avLst/>
-          </a:prstGeom>
-        </p:spPr>
-        <p:style>
-          <a:lnRef idx="1">
-            <a:schemeClr val="accent1"/>
-          </a:lnRef>
-          <a:fillRef idx="0">
-            <a:schemeClr val="accent1"/>
-          </a:fillRef>
-          <a:effectRef idx="0">
-            <a:schemeClr val="accent1"/>
-          </a:effectRef>
-          <a:fontRef idx="minor">
-            <a:schemeClr val="tx1"/>
-          </a:fontRef>
-        </p:style>
-      </p:cxnSp>
-      <p:cxnSp>
-        <p:nvCxnSpPr>
-          <p:cNvPr id="48" name="Straight Connector 47"/>
-          <p:cNvCxnSpPr>
-            <a:stCxn id="10" idx="3"/>
-            <a:endCxn id="15" idx="1"/>
-          </p:cNvCxnSpPr>
-          <p:nvPr/>
-        </p:nvCxnSpPr>
-        <p:spPr>
-          <a:xfrm flipV="1">
-            <a:off x="5138130" y="4593983"/>
-            <a:ext cx="1535904" cy="8313"/>
-          </a:xfrm>
-          <a:prstGeom prst="line">
-            <a:avLst/>
-          </a:prstGeom>
-        </p:spPr>
-        <p:style>
-          <a:lnRef idx="1">
-            <a:schemeClr val="accent1"/>
-          </a:lnRef>
-          <a:fillRef idx="0">
-            <a:schemeClr val="accent1"/>
-          </a:fillRef>
-          <a:effectRef idx="0">
-            <a:schemeClr val="accent1"/>
-          </a:effectRef>
-          <a:fontRef idx="minor">
-            <a:schemeClr val="tx1"/>
-          </a:fontRef>
-        </p:style>
-      </p:cxnSp>
-      <p:cxnSp>
-        <p:nvCxnSpPr>
-          <p:cNvPr id="50" name="Straight Connector 49"/>
-          <p:cNvCxnSpPr>
-            <a:stCxn id="15" idx="3"/>
-          </p:cNvCxnSpPr>
-          <p:nvPr/>
-        </p:nvCxnSpPr>
-        <p:spPr>
-          <a:xfrm>
-            <a:off x="7647709" y="4593983"/>
-            <a:ext cx="924378" cy="0"/>
-          </a:xfrm>
-          <a:prstGeom prst="line">
-            <a:avLst/>
-          </a:prstGeom>
-        </p:spPr>
-        <p:style>
-          <a:lnRef idx="1">
-            <a:schemeClr val="accent1"/>
-          </a:lnRef>
-          <a:fillRef idx="0">
-            <a:schemeClr val="accent1"/>
-          </a:fillRef>
-          <a:effectRef idx="0">
-            <a:schemeClr val="accent1"/>
-          </a:effectRef>
-          <a:fontRef idx="minor">
-            <a:schemeClr val="tx1"/>
-          </a:fontRef>
-        </p:style>
-      </p:cxnSp>
-      <p:cxnSp>
-        <p:nvCxnSpPr>
-          <p:cNvPr id="52" name="Straight Connector 51"/>
-          <p:cNvCxnSpPr>
-            <a:endCxn id="11" idx="2"/>
-          </p:cNvCxnSpPr>
-          <p:nvPr/>
-        </p:nvCxnSpPr>
-        <p:spPr>
-          <a:xfrm flipV="1">
-            <a:off x="8572674" y="3877306"/>
-            <a:ext cx="4049" cy="724990"/>
-          </a:xfrm>
-          <a:prstGeom prst="line">
-            <a:avLst/>
-          </a:prstGeom>
-        </p:spPr>
-        <p:style>
-          <a:lnRef idx="1">
-            <a:schemeClr val="accent1"/>
-          </a:lnRef>
-          <a:fillRef idx="0">
-            <a:schemeClr val="accent1"/>
-          </a:fillRef>
-          <a:effectRef idx="0">
-            <a:schemeClr val="accent1"/>
-          </a:effectRef>
-          <a:fontRef idx="minor">
-            <a:schemeClr val="tx1"/>
-          </a:fontRef>
-        </p:style>
-      </p:cxnSp>
-      <p:cxnSp>
-        <p:nvCxnSpPr>
-          <p:cNvPr id="57" name="Straight Connector 56"/>
-          <p:cNvCxnSpPr>
-            <a:stCxn id="8" idx="2"/>
-            <a:endCxn id="14" idx="0"/>
-          </p:cNvCxnSpPr>
-          <p:nvPr/>
-        </p:nvCxnSpPr>
-        <p:spPr>
-          <a:xfrm flipH="1">
-            <a:off x="8571020" y="2447880"/>
-            <a:ext cx="1067" cy="355477"/>
-          </a:xfrm>
-          <a:prstGeom prst="line">
-            <a:avLst/>
-          </a:prstGeom>
-        </p:spPr>
-        <p:style>
-          <a:lnRef idx="1">
-            <a:schemeClr val="accent1"/>
-          </a:lnRef>
-          <a:fillRef idx="0">
-            <a:schemeClr val="accent1"/>
-          </a:fillRef>
-          <a:effectRef idx="0">
-            <a:schemeClr val="accent1"/>
-          </a:effectRef>
-          <a:fontRef idx="minor">
-            <a:schemeClr val="tx1"/>
-          </a:fontRef>
-        </p:style>
-      </p:cxnSp>
-      <p:cxnSp>
-        <p:nvCxnSpPr>
-          <p:cNvPr id="59" name="Straight Connector 58"/>
-          <p:cNvCxnSpPr>
-            <a:stCxn id="14" idx="2"/>
-            <a:endCxn id="11" idx="0"/>
-          </p:cNvCxnSpPr>
-          <p:nvPr/>
-        </p:nvCxnSpPr>
-        <p:spPr>
-          <a:xfrm>
-            <a:off x="8571020" y="3189316"/>
-            <a:ext cx="5703" cy="318658"/>
-          </a:xfrm>
-          <a:prstGeom prst="line">
-            <a:avLst/>
-          </a:prstGeom>
-        </p:spPr>
-        <p:style>
-          <a:lnRef idx="1">
-            <a:schemeClr val="accent1"/>
-          </a:lnRef>
-          <a:fillRef idx="0">
-            <a:schemeClr val="accent1"/>
-          </a:fillRef>
-          <a:effectRef idx="0">
-            <a:schemeClr val="accent1"/>
-          </a:effectRef>
-          <a:fontRef idx="minor">
-            <a:schemeClr val="tx1"/>
-          </a:fontRef>
-        </p:style>
-      </p:cxnSp>
-      <p:cxnSp>
-        <p:nvCxnSpPr>
-          <p:cNvPr id="62" name="Straight Connector 61"/>
-          <p:cNvCxnSpPr>
-            <a:stCxn id="7" idx="3"/>
-            <a:endCxn id="20" idx="1"/>
-          </p:cNvCxnSpPr>
-          <p:nvPr/>
-        </p:nvCxnSpPr>
-        <p:spPr>
-          <a:xfrm>
-            <a:off x="980719" y="5869401"/>
-            <a:ext cx="926531" cy="0"/>
-          </a:xfrm>
-          <a:prstGeom prst="line">
-            <a:avLst/>
-          </a:prstGeom>
-        </p:spPr>
-        <p:style>
-          <a:lnRef idx="1">
-            <a:schemeClr val="accent1"/>
-          </a:lnRef>
-          <a:fillRef idx="0">
-            <a:schemeClr val="accent1"/>
-          </a:fillRef>
-          <a:effectRef idx="0">
-            <a:schemeClr val="accent1"/>
-          </a:effectRef>
-          <a:fontRef idx="minor">
-            <a:schemeClr val="tx1"/>
-          </a:fontRef>
-        </p:style>
-      </p:cxnSp>
-      <p:cxnSp>
-        <p:nvCxnSpPr>
-          <p:cNvPr id="64" name="Straight Connector 63"/>
-          <p:cNvCxnSpPr>
-            <a:stCxn id="20" idx="3"/>
-          </p:cNvCxnSpPr>
-          <p:nvPr/>
-        </p:nvCxnSpPr>
-        <p:spPr>
-          <a:xfrm>
-            <a:off x="3027217" y="5869401"/>
-            <a:ext cx="803562" cy="0"/>
-          </a:xfrm>
-          <a:prstGeom prst="line">
-            <a:avLst/>
-          </a:prstGeom>
-        </p:spPr>
-        <p:style>
-          <a:lnRef idx="1">
-            <a:schemeClr val="accent1"/>
-          </a:lnRef>
-          <a:fillRef idx="0">
-            <a:schemeClr val="accent1"/>
-          </a:fillRef>
-          <a:effectRef idx="0">
-            <a:schemeClr val="accent1"/>
-          </a:effectRef>
-          <a:fontRef idx="minor">
-            <a:schemeClr val="tx1"/>
-          </a:fontRef>
-        </p:style>
-      </p:cxnSp>
-      <p:cxnSp>
-        <p:nvCxnSpPr>
-          <p:cNvPr id="66" name="Straight Connector 65"/>
-          <p:cNvCxnSpPr/>
-          <p:nvPr/>
-        </p:nvCxnSpPr>
-        <p:spPr>
-          <a:xfrm flipV="1">
-            <a:off x="3830779" y="4786962"/>
-            <a:ext cx="0" cy="1082438"/>
-          </a:xfrm>
-          <a:prstGeom prst="line">
-            <a:avLst/>
-          </a:prstGeom>
-        </p:spPr>
-        <p:style>
-          <a:lnRef idx="1">
-            <a:schemeClr val="accent1"/>
-          </a:lnRef>
-          <a:fillRef idx="0">
-            <a:schemeClr val="accent1"/>
-          </a:fillRef>
-          <a:effectRef idx="0">
-            <a:schemeClr val="accent1"/>
-          </a:effectRef>
-          <a:fontRef idx="minor">
-            <a:schemeClr val="tx1"/>
-          </a:fontRef>
-        </p:style>
-      </p:cxnSp>
-      <p:cxnSp>
-        <p:nvCxnSpPr>
-          <p:cNvPr id="68" name="Straight Connector 67"/>
-          <p:cNvCxnSpPr>
-            <a:stCxn id="10" idx="2"/>
-          </p:cNvCxnSpPr>
-          <p:nvPr/>
-        </p:nvCxnSpPr>
-        <p:spPr>
-          <a:xfrm flipH="1">
-            <a:off x="4293956" y="4786962"/>
-            <a:ext cx="1" cy="1275418"/>
-          </a:xfrm>
-          <a:prstGeom prst="line">
-            <a:avLst/>
-          </a:prstGeom>
-        </p:spPr>
-        <p:style>
-          <a:lnRef idx="1">
-            <a:schemeClr val="accent1"/>
-          </a:lnRef>
-          <a:fillRef idx="0">
-            <a:schemeClr val="accent1"/>
-          </a:fillRef>
-          <a:effectRef idx="0">
-            <a:schemeClr val="accent1"/>
-          </a:effectRef>
-          <a:fontRef idx="minor">
-            <a:schemeClr val="tx1"/>
-          </a:fontRef>
-        </p:style>
-      </p:cxnSp>
-      <p:cxnSp>
-        <p:nvCxnSpPr>
-          <p:cNvPr id="70" name="Straight Connector 69"/>
-          <p:cNvCxnSpPr>
-            <a:stCxn id="16" idx="1"/>
-          </p:cNvCxnSpPr>
-          <p:nvPr/>
-        </p:nvCxnSpPr>
-        <p:spPr>
-          <a:xfrm flipH="1" flipV="1">
-            <a:off x="4287981" y="6062381"/>
-            <a:ext cx="4538778" cy="2956"/>
-          </a:xfrm>
-          <a:prstGeom prst="line">
-            <a:avLst/>
-          </a:prstGeom>
-        </p:spPr>
-        <p:style>
-          <a:lnRef idx="1">
-            <a:schemeClr val="accent1"/>
-          </a:lnRef>
-          <a:fillRef idx="0">
-            <a:schemeClr val="accent1"/>
-          </a:fillRef>
-          <a:effectRef idx="0">
-            <a:schemeClr val="accent1"/>
-          </a:effectRef>
-          <a:fontRef idx="minor">
-            <a:schemeClr val="tx1"/>
-          </a:fontRef>
-        </p:style>
-      </p:cxnSp>
-      <p:cxnSp>
-        <p:nvCxnSpPr>
-          <p:cNvPr id="73" name="Straight Connector 72"/>
-          <p:cNvCxnSpPr>
-            <a:stCxn id="8" idx="3"/>
-          </p:cNvCxnSpPr>
-          <p:nvPr/>
-        </p:nvCxnSpPr>
-        <p:spPr>
-          <a:xfrm flipV="1">
-            <a:off x="9039266" y="2242666"/>
-            <a:ext cx="2324513" cy="20548"/>
-          </a:xfrm>
-          <a:prstGeom prst="line">
-            <a:avLst/>
-          </a:prstGeom>
-        </p:spPr>
-        <p:style>
-          <a:lnRef idx="1">
-            <a:schemeClr val="accent1"/>
-          </a:lnRef>
-          <a:fillRef idx="0">
-            <a:schemeClr val="accent1"/>
-          </a:fillRef>
-          <a:effectRef idx="0">
-            <a:schemeClr val="accent1"/>
-          </a:effectRef>
-          <a:fontRef idx="minor">
-            <a:schemeClr val="tx1"/>
-          </a:fontRef>
-        </p:style>
-      </p:cxnSp>
-      <p:cxnSp>
-        <p:nvCxnSpPr>
-          <p:cNvPr id="75" name="Straight Connector 74"/>
-          <p:cNvCxnSpPr>
-            <a:stCxn id="16" idx="3"/>
-          </p:cNvCxnSpPr>
-          <p:nvPr/>
-        </p:nvCxnSpPr>
-        <p:spPr>
-          <a:xfrm flipV="1">
-            <a:off x="9813308" y="6062381"/>
-            <a:ext cx="1540492" cy="2956"/>
-          </a:xfrm>
-          <a:prstGeom prst="line">
-            <a:avLst/>
-          </a:prstGeom>
-        </p:spPr>
-        <p:style>
-          <a:lnRef idx="1">
-            <a:schemeClr val="accent1"/>
-          </a:lnRef>
-          <a:fillRef idx="0">
-            <a:schemeClr val="accent1"/>
-          </a:fillRef>
-          <a:effectRef idx="0">
-            <a:schemeClr val="accent1"/>
-          </a:effectRef>
-          <a:fontRef idx="minor">
-            <a:schemeClr val="tx1"/>
-          </a:fontRef>
-        </p:style>
-      </p:cxnSp>
-      <p:cxnSp>
-        <p:nvCxnSpPr>
-          <p:cNvPr id="78" name="Straight Connector 77"/>
-          <p:cNvCxnSpPr/>
-          <p:nvPr/>
-        </p:nvCxnSpPr>
-        <p:spPr>
-          <a:xfrm flipV="1">
-            <a:off x="11353800" y="2242666"/>
-            <a:ext cx="0" cy="3811401"/>
-          </a:xfrm>
-          <a:prstGeom prst="line">
-            <a:avLst/>
-          </a:prstGeom>
-        </p:spPr>
-        <p:style>
-          <a:lnRef idx="1">
-            <a:schemeClr val="accent1"/>
-          </a:lnRef>
-          <a:fillRef idx="0">
-            <a:schemeClr val="accent1"/>
-          </a:fillRef>
-          <a:effectRef idx="0">
-            <a:schemeClr val="accent1"/>
-          </a:effectRef>
-          <a:fontRef idx="minor">
-            <a:schemeClr val="tx1"/>
-          </a:fontRef>
-        </p:style>
-      </p:cxnSp>
-      <p:sp>
-        <p:nvSpPr>
-          <p:cNvPr id="80" name="Rectangle 79"/>
-          <p:cNvSpPr/>
-          <p:nvPr/>
-        </p:nvSpPr>
-        <p:spPr>
-          <a:xfrm>
-            <a:off x="195943" y="141317"/>
-            <a:ext cx="642257" cy="284235"/>
-          </a:xfrm>
-          <a:prstGeom prst="rect">
-            <a:avLst/>
-          </a:prstGeom>
-          <a:solidFill>
-            <a:schemeClr val="accent2">
-              <a:lumMod val="40000"/>
-              <a:lumOff val="60000"/>
-            </a:schemeClr>
-          </a:solidFill>
-          <a:ln w="31750">
-            <a:solidFill>
-              <a:schemeClr val="tx1"/>
-            </a:solidFill>
-          </a:ln>
-        </p:spPr>
-        <p:style>
-          <a:lnRef idx="2">
-            <a:schemeClr val="accent1">
-              <a:shade val="50000"/>
-            </a:schemeClr>
-          </a:lnRef>
-          <a:fillRef idx="1">
-            <a:schemeClr val="accent1"/>
-          </a:fillRef>
-          <a:effectRef idx="0">
-            <a:schemeClr val="accent1"/>
-          </a:effectRef>
-          <a:fontRef idx="minor">
-            <a:schemeClr val="lt1"/>
-          </a:fontRef>
-        </p:style>
-        <p:txBody>
-          <a:bodyPr rtlCol="0" anchor="ctr"/>
-          <a:lstStyle/>
-          <a:p>
-            <a:pPr algn="ctr"/>
-            <a:endParaRPr lang="en-US"/>
-          </a:p>
-        </p:txBody>
-      </p:sp>
-      <p:sp>
-        <p:nvSpPr>
-          <p:cNvPr id="81" name="Rectangle 80"/>
-          <p:cNvSpPr/>
-          <p:nvPr/>
-        </p:nvSpPr>
-        <p:spPr>
-          <a:xfrm>
-            <a:off x="195942" y="584863"/>
-            <a:ext cx="642257" cy="284235"/>
-          </a:xfrm>
-          <a:prstGeom prst="rect">
-            <a:avLst/>
-          </a:prstGeom>
-          <a:solidFill>
-            <a:schemeClr val="accent6">
-              <a:lumMod val="20000"/>
-              <a:lumOff val="80000"/>
-            </a:schemeClr>
-          </a:solidFill>
-          <a:ln w="31750" cmpd="dbl">
-            <a:solidFill>
-              <a:schemeClr val="tx1"/>
-            </a:solidFill>
-          </a:ln>
-        </p:spPr>
         <p:style>
           <a:lnRef idx="2">
             <a:schemeClr val="accent1">
@@ -12038,7 +11453,7 @@
         </p:nvCxnSpPr>
         <p:spPr>
           <a:xfrm flipV="1">
-            <a:off x="3284376" y="4437025"/>
+            <a:off x="3428310" y="4437025"/>
             <a:ext cx="165407" cy="165271"/>
           </a:xfrm>
           <a:prstGeom prst="line">
@@ -12068,8 +11483,248 @@
         </p:nvCxnSpPr>
         <p:spPr>
           <a:xfrm>
-            <a:off x="3294976" y="4602296"/>
+            <a:off x="3438911" y="4610763"/>
             <a:ext cx="154807" cy="111728"/>
+          </a:xfrm>
+          <a:prstGeom prst="line">
+            <a:avLst/>
+          </a:prstGeom>
+        </p:spPr>
+        <p:style>
+          <a:lnRef idx="1">
+            <a:schemeClr val="accent1"/>
+          </a:lnRef>
+          <a:fillRef idx="0">
+            <a:schemeClr val="accent1"/>
+          </a:fillRef>
+          <a:effectRef idx="0">
+            <a:schemeClr val="accent1"/>
+          </a:effectRef>
+          <a:fontRef idx="minor">
+            <a:schemeClr val="tx1"/>
+          </a:fontRef>
+        </p:style>
+      </p:cxnSp>
+      <p:cxnSp>
+        <p:nvCxnSpPr>
+          <p:cNvPr id="74" name="Straight Connector 73"/>
+          <p:cNvCxnSpPr/>
+          <p:nvPr/>
+        </p:nvCxnSpPr>
+        <p:spPr>
+          <a:xfrm>
+            <a:off x="8572088" y="1898127"/>
+            <a:ext cx="128754" cy="173976"/>
+          </a:xfrm>
+          <a:prstGeom prst="line">
+            <a:avLst/>
+          </a:prstGeom>
+        </p:spPr>
+        <p:style>
+          <a:lnRef idx="1">
+            <a:schemeClr val="accent1"/>
+          </a:lnRef>
+          <a:fillRef idx="0">
+            <a:schemeClr val="accent1"/>
+          </a:fillRef>
+          <a:effectRef idx="0">
+            <a:schemeClr val="accent1"/>
+          </a:effectRef>
+          <a:fontRef idx="minor">
+            <a:schemeClr val="tx1"/>
+          </a:fontRef>
+        </p:style>
+      </p:cxnSp>
+      <p:cxnSp>
+        <p:nvCxnSpPr>
+          <p:cNvPr id="76" name="Straight Connector 75"/>
+          <p:cNvCxnSpPr/>
+          <p:nvPr/>
+        </p:nvCxnSpPr>
+        <p:spPr>
+          <a:xfrm flipV="1">
+            <a:off x="8448176" y="1897822"/>
+            <a:ext cx="123912" cy="157348"/>
+          </a:xfrm>
+          <a:prstGeom prst="line">
+            <a:avLst/>
+          </a:prstGeom>
+        </p:spPr>
+        <p:style>
+          <a:lnRef idx="1">
+            <a:schemeClr val="accent1"/>
+          </a:lnRef>
+          <a:fillRef idx="0">
+            <a:schemeClr val="accent1"/>
+          </a:fillRef>
+          <a:effectRef idx="0">
+            <a:schemeClr val="accent1"/>
+          </a:effectRef>
+          <a:fontRef idx="minor">
+            <a:schemeClr val="tx1"/>
+          </a:fontRef>
+        </p:style>
+      </p:cxnSp>
+      <p:cxnSp>
+        <p:nvCxnSpPr>
+          <p:cNvPr id="77" name="Straight Connector 76"/>
+          <p:cNvCxnSpPr/>
+          <p:nvPr/>
+        </p:nvCxnSpPr>
+        <p:spPr>
+          <a:xfrm flipV="1">
+            <a:off x="3766980" y="2836822"/>
+            <a:ext cx="165407" cy="165271"/>
+          </a:xfrm>
+          <a:prstGeom prst="line">
+            <a:avLst/>
+          </a:prstGeom>
+        </p:spPr>
+        <p:style>
+          <a:lnRef idx="1">
+            <a:schemeClr val="accent1"/>
+          </a:lnRef>
+          <a:fillRef idx="0">
+            <a:schemeClr val="accent1"/>
+          </a:fillRef>
+          <a:effectRef idx="0">
+            <a:schemeClr val="accent1"/>
+          </a:effectRef>
+          <a:fontRef idx="minor">
+            <a:schemeClr val="tx1"/>
+          </a:fontRef>
+        </p:style>
+      </p:cxnSp>
+      <p:cxnSp>
+        <p:nvCxnSpPr>
+          <p:cNvPr id="86" name="Straight Connector 85"/>
+          <p:cNvCxnSpPr/>
+          <p:nvPr/>
+        </p:nvCxnSpPr>
+        <p:spPr>
+          <a:xfrm>
+            <a:off x="3786043" y="2993628"/>
+            <a:ext cx="154807" cy="111728"/>
+          </a:xfrm>
+          <a:prstGeom prst="line">
+            <a:avLst/>
+          </a:prstGeom>
+        </p:spPr>
+        <p:style>
+          <a:lnRef idx="1">
+            <a:schemeClr val="accent1"/>
+          </a:lnRef>
+          <a:fillRef idx="0">
+            <a:schemeClr val="accent1"/>
+          </a:fillRef>
+          <a:effectRef idx="0">
+            <a:schemeClr val="accent1"/>
+          </a:effectRef>
+          <a:fontRef idx="minor">
+            <a:schemeClr val="tx1"/>
+          </a:fontRef>
+        </p:style>
+      </p:cxnSp>
+      <p:cxnSp>
+        <p:nvCxnSpPr>
+          <p:cNvPr id="87" name="Straight Connector 86"/>
+          <p:cNvCxnSpPr/>
+          <p:nvPr/>
+        </p:nvCxnSpPr>
+        <p:spPr>
+          <a:xfrm flipV="1">
+            <a:off x="4162315" y="2643454"/>
+            <a:ext cx="123912" cy="157348"/>
+          </a:xfrm>
+          <a:prstGeom prst="line">
+            <a:avLst/>
+          </a:prstGeom>
+        </p:spPr>
+        <p:style>
+          <a:lnRef idx="1">
+            <a:schemeClr val="accent1"/>
+          </a:lnRef>
+          <a:fillRef idx="0">
+            <a:schemeClr val="accent1"/>
+          </a:fillRef>
+          <a:effectRef idx="0">
+            <a:schemeClr val="accent1"/>
+          </a:effectRef>
+          <a:fontRef idx="minor">
+            <a:schemeClr val="tx1"/>
+          </a:fontRef>
+        </p:style>
+      </p:cxnSp>
+      <p:cxnSp>
+        <p:nvCxnSpPr>
+          <p:cNvPr id="88" name="Straight Connector 87"/>
+          <p:cNvCxnSpPr/>
+          <p:nvPr/>
+        </p:nvCxnSpPr>
+        <p:spPr>
+          <a:xfrm>
+            <a:off x="4277022" y="2643454"/>
+            <a:ext cx="128754" cy="173976"/>
+          </a:xfrm>
+          <a:prstGeom prst="line">
+            <a:avLst/>
+          </a:prstGeom>
+        </p:spPr>
+        <p:style>
+          <a:lnRef idx="1">
+            <a:schemeClr val="accent1"/>
+          </a:lnRef>
+          <a:fillRef idx="0">
+            <a:schemeClr val="accent1"/>
+          </a:fillRef>
+          <a:effectRef idx="0">
+            <a:schemeClr val="accent1"/>
+          </a:effectRef>
+          <a:fontRef idx="minor">
+            <a:schemeClr val="tx1"/>
+          </a:fontRef>
+        </p:style>
+      </p:cxnSp>
+      <p:cxnSp>
+        <p:nvCxnSpPr>
+          <p:cNvPr id="89" name="Straight Connector 88"/>
+          <p:cNvCxnSpPr/>
+          <p:nvPr/>
+        </p:nvCxnSpPr>
+        <p:spPr>
+          <a:xfrm flipH="1" flipV="1">
+            <a:off x="4185343" y="4786960"/>
+            <a:ext cx="102637" cy="176924"/>
+          </a:xfrm>
+          <a:prstGeom prst="line">
+            <a:avLst/>
+          </a:prstGeom>
+        </p:spPr>
+        <p:style>
+          <a:lnRef idx="1">
+            <a:schemeClr val="accent1"/>
+          </a:lnRef>
+          <a:fillRef idx="0">
+            <a:schemeClr val="accent1"/>
+          </a:fillRef>
+          <a:effectRef idx="0">
+            <a:schemeClr val="accent1"/>
+          </a:effectRef>
+          <a:fontRef idx="minor">
+            <a:schemeClr val="tx1"/>
+          </a:fontRef>
+        </p:style>
+      </p:cxnSp>
+      <p:cxnSp>
+        <p:nvCxnSpPr>
+          <p:cNvPr id="90" name="Straight Connector 89"/>
+          <p:cNvCxnSpPr/>
+          <p:nvPr/>
+        </p:nvCxnSpPr>
+        <p:spPr>
+          <a:xfrm flipV="1">
+            <a:off x="4287979" y="4789422"/>
+            <a:ext cx="101141" cy="157529"/>
           </a:xfrm>
           <a:prstGeom prst="line">
             <a:avLst/>

</xml_diff>